<commit_message>
updated the ML Design doc with more details
</commit_message>
<xml_diff>
--- a/documentation/design/OiAIP & iPack ML Design Doc.pptx
+++ b/documentation/design/OiAIP & iPack ML Design Doc.pptx
@@ -8,6 +8,8 @@
     <p:sldId id="256" r:id="rId2"/>
     <p:sldId id="257" r:id="rId3"/>
     <p:sldId id="258" r:id="rId4"/>
+    <p:sldId id="260" r:id="rId5"/>
+    <p:sldId id="259" r:id="rId6"/>
   </p:sldIdLst>
   <p:sldSz cx="12192000" cy="6858000"/>
   <p:notesSz cx="6858000" cy="9144000"/>
@@ -106,6 +108,11 @@
       </a:defRPr>
     </a:lvl9pPr>
   </p:defaultTextStyle>
+  <p:extLst>
+    <p:ext uri="{EFAFB233-063F-42B5-8137-9DF3F51BA10A}">
+      <p15:sldGuideLst xmlns:p15="http://schemas.microsoft.com/office/powerpoint/2012/main"/>
+    </p:ext>
+  </p:extLst>
 </p:presentation>
 </file>
 
@@ -4231,7 +4238,9 @@
           </a:xfrm>
         </p:spPr>
         <p:txBody>
-          <a:bodyPr anchor="t"/>
+          <a:bodyPr anchor="t">
+            <a:normAutofit fontScale="92500" lnSpcReduction="10000"/>
+          </a:bodyPr>
           <a:lstStyle/>
           <a:p>
             <a:r>
@@ -4243,6 +4252,19 @@
             <a:r>
               <a:rPr lang="en-US" dirty="0"/>
               <a:t>Define Workloads requiring models &amp; expected model drop location.</a:t>
+            </a:r>
+          </a:p>
+          <a:p>
+            <a:r>
+              <a:rPr lang="en-US" dirty="0"/>
+              <a:t>Creating Interface Leveraging Resources &amp; Endpoints provisioned by Platform</a:t>
+            </a:r>
+          </a:p>
+          <a:p>
+            <a:pPr lvl="1"/>
+            <a:r>
+              <a:rPr lang="en-US" dirty="0"/>
+              <a:t>Implemented as part of admin app</a:t>
             </a:r>
           </a:p>
           <a:p>
@@ -4791,15 +4813,290 @@
             <p:ph type="title"/>
           </p:nvPr>
         </p:nvSpPr>
-        <p:spPr/>
-        <p:txBody>
-          <a:bodyPr/>
+        <p:spPr>
+          <a:xfrm>
+            <a:off x="581192" y="702156"/>
+            <a:ext cx="11029616" cy="472303"/>
+          </a:xfrm>
+        </p:spPr>
+        <p:txBody>
+          <a:bodyPr>
+            <a:normAutofit fontScale="90000"/>
+          </a:bodyPr>
           <a:lstStyle/>
           <a:p>
             <a:r>
               <a:rPr lang="en-US" dirty="0"/>
               <a:t>OOB Model Flow</a:t>
             </a:r>
+          </a:p>
+        </p:txBody>
+      </p:sp>
+      <p:sp>
+        <p:nvSpPr>
+          <p:cNvPr id="3" name="Rectangle: Rounded Corners 2">
+            <a:extLst>
+              <a:ext uri="{FF2B5EF4-FFF2-40B4-BE49-F238E27FC236}">
+                <a16:creationId xmlns:a16="http://schemas.microsoft.com/office/drawing/2014/main" id="{3C989E45-4A6F-4FB1-BAFC-565FC8FD0831}"/>
+              </a:ext>
+            </a:extLst>
+          </p:cNvPr>
+          <p:cNvSpPr/>
+          <p:nvPr/>
+        </p:nvSpPr>
+        <p:spPr>
+          <a:xfrm>
+            <a:off x="369116" y="5981350"/>
+            <a:ext cx="1308682" cy="645953"/>
+          </a:xfrm>
+          <a:prstGeom prst="roundRect">
+            <a:avLst/>
+          </a:prstGeom>
+        </p:spPr>
+        <p:style>
+          <a:lnRef idx="2">
+            <a:schemeClr val="accent1">
+              <a:shade val="50000"/>
+            </a:schemeClr>
+          </a:lnRef>
+          <a:fillRef idx="1">
+            <a:schemeClr val="accent1"/>
+          </a:fillRef>
+          <a:effectRef idx="0">
+            <a:schemeClr val="accent1"/>
+          </a:effectRef>
+          <a:fontRef idx="minor">
+            <a:schemeClr val="lt1"/>
+          </a:fontRef>
+        </p:style>
+        <p:txBody>
+          <a:bodyPr rtlCol="0" anchor="ctr"/>
+          <a:lstStyle/>
+          <a:p>
+            <a:pPr algn="ctr"/>
+            <a:r>
+              <a:rPr lang="en-US" dirty="0"/>
+              <a:t>Upload </a:t>
+            </a:r>
+            <a:r>
+              <a:rPr lang="en-US" dirty="0" err="1"/>
+              <a:t>iPack</a:t>
+            </a:r>
+            <a:endParaRPr lang="en-US" dirty="0"/>
+          </a:p>
+        </p:txBody>
+      </p:sp>
+      <p:sp>
+        <p:nvSpPr>
+          <p:cNvPr id="4" name="Rectangle: Rounded Corners 3">
+            <a:extLst>
+              <a:ext uri="{FF2B5EF4-FFF2-40B4-BE49-F238E27FC236}">
+                <a16:creationId xmlns:a16="http://schemas.microsoft.com/office/drawing/2014/main" id="{BCDCCADF-6DB8-4866-B5B0-BD09A49CAA64}"/>
+              </a:ext>
+            </a:extLst>
+          </p:cNvPr>
+          <p:cNvSpPr/>
+          <p:nvPr/>
+        </p:nvSpPr>
+        <p:spPr>
+          <a:xfrm>
+            <a:off x="5128557" y="2657386"/>
+            <a:ext cx="4024968" cy="3799340"/>
+          </a:xfrm>
+          <a:prstGeom prst="roundRect">
+            <a:avLst/>
+          </a:prstGeom>
+        </p:spPr>
+        <p:style>
+          <a:lnRef idx="2">
+            <a:schemeClr val="accent1">
+              <a:shade val="50000"/>
+            </a:schemeClr>
+          </a:lnRef>
+          <a:fillRef idx="1">
+            <a:schemeClr val="accent1"/>
+          </a:fillRef>
+          <a:effectRef idx="0">
+            <a:schemeClr val="accent1"/>
+          </a:effectRef>
+          <a:fontRef idx="minor">
+            <a:schemeClr val="lt1"/>
+          </a:fontRef>
+        </p:style>
+        <p:txBody>
+          <a:bodyPr rtlCol="0" anchor="t"/>
+          <a:lstStyle/>
+          <a:p>
+            <a:pPr algn="ctr"/>
+            <a:r>
+              <a:rPr lang="en-US" b="1" dirty="0"/>
+              <a:t>ML APIS in OIAIP</a:t>
+            </a:r>
+          </a:p>
+          <a:p>
+            <a:pPr marL="285750" indent="-285750">
+              <a:buFont typeface="Arial" panose="020B0604020202020204" pitchFamily="34" charset="0"/>
+              <a:buChar char="•"/>
+            </a:pPr>
+            <a:r>
+              <a:rPr lang="en-US" sz="1600" dirty="0"/>
+              <a:t>Capture New Data for </a:t>
+            </a:r>
+            <a:r>
+              <a:rPr lang="en-US" sz="1600" dirty="0" err="1"/>
+              <a:t>iPack</a:t>
+            </a:r>
+            <a:endParaRPr lang="en-US" sz="1600" dirty="0"/>
+          </a:p>
+          <a:p>
+            <a:pPr marL="285750" indent="-285750">
+              <a:buFont typeface="Arial" panose="020B0604020202020204" pitchFamily="34" charset="0"/>
+              <a:buChar char="•"/>
+            </a:pPr>
+            <a:r>
+              <a:rPr lang="en-US" sz="1600" dirty="0"/>
+              <a:t>Get # Currently Staged Captured data for </a:t>
+            </a:r>
+            <a:r>
+              <a:rPr lang="en-US" sz="1600" dirty="0" err="1"/>
+              <a:t>iPack</a:t>
+            </a:r>
+            <a:endParaRPr lang="en-US" sz="1600" dirty="0"/>
+          </a:p>
+          <a:p>
+            <a:pPr marL="285750" indent="-285750">
+              <a:buFont typeface="Arial" panose="020B0604020202020204" pitchFamily="34" charset="0"/>
+              <a:buChar char="•"/>
+            </a:pPr>
+            <a:r>
+              <a:rPr lang="en-US" sz="1600" dirty="0"/>
+              <a:t>Train specific model in specific </a:t>
+            </a:r>
+            <a:r>
+              <a:rPr lang="en-US" sz="1600" dirty="0" err="1"/>
+              <a:t>iPack</a:t>
+            </a:r>
+            <a:r>
+              <a:rPr lang="en-US" sz="1600" dirty="0"/>
+              <a:t> with specific parameters</a:t>
+            </a:r>
+          </a:p>
+          <a:p>
+            <a:pPr marL="285750" indent="-285750">
+              <a:buFont typeface="Arial" panose="020B0604020202020204" pitchFamily="34" charset="0"/>
+              <a:buChar char="•"/>
+            </a:pPr>
+            <a:r>
+              <a:rPr lang="en-US" sz="1600" dirty="0"/>
+              <a:t>Get available parameters for model definition</a:t>
+            </a:r>
+          </a:p>
+          <a:p>
+            <a:pPr marL="285750" indent="-285750">
+              <a:buFont typeface="Arial" panose="020B0604020202020204" pitchFamily="34" charset="0"/>
+              <a:buChar char="•"/>
+            </a:pPr>
+            <a:r>
+              <a:rPr lang="en-US" sz="1600" dirty="0"/>
+              <a:t>get specific model’s train runs &amp; metrics </a:t>
+            </a:r>
+          </a:p>
+          <a:p>
+            <a:pPr marL="285750" indent="-285750">
+              <a:buFont typeface="Arial" panose="020B0604020202020204" pitchFamily="34" charset="0"/>
+              <a:buChar char="•"/>
+            </a:pPr>
+            <a:r>
+              <a:rPr lang="en-US" sz="1600" dirty="0"/>
+              <a:t>export &amp; register specific train run.</a:t>
+            </a:r>
+          </a:p>
+          <a:p>
+            <a:pPr marL="285750" indent="-285750">
+              <a:buFont typeface="Arial" panose="020B0604020202020204" pitchFamily="34" charset="0"/>
+              <a:buChar char="•"/>
+            </a:pPr>
+            <a:r>
+              <a:rPr lang="en-US" sz="1600" dirty="0"/>
+              <a:t>Get telemetry access information</a:t>
+            </a:r>
+          </a:p>
+          <a:p>
+            <a:pPr marL="285750" indent="-285750">
+              <a:buFont typeface="Arial" panose="020B0604020202020204" pitchFamily="34" charset="0"/>
+              <a:buChar char="•"/>
+            </a:pPr>
+            <a:r>
+              <a:rPr lang="en-US" sz="1600" dirty="0"/>
+              <a:t>Get captured data staging access information</a:t>
+            </a:r>
+          </a:p>
+          <a:p>
+            <a:pPr marL="285750" indent="-285750">
+              <a:buFont typeface="Arial" panose="020B0604020202020204" pitchFamily="34" charset="0"/>
+              <a:buChar char="•"/>
+            </a:pPr>
+            <a:r>
+              <a:rPr lang="en-US" sz="1600" dirty="0"/>
+              <a:t>Clear captured data staging store</a:t>
+            </a:r>
+          </a:p>
+          <a:p>
+            <a:pPr marL="285750" indent="-285750">
+              <a:buFont typeface="Arial" panose="020B0604020202020204" pitchFamily="34" charset="0"/>
+              <a:buChar char="•"/>
+            </a:pPr>
+            <a:endParaRPr lang="en-US" dirty="0"/>
+          </a:p>
+        </p:txBody>
+      </p:sp>
+      <p:sp>
+        <p:nvSpPr>
+          <p:cNvPr id="5" name="Rectangle: Rounded Corners 4">
+            <a:extLst>
+              <a:ext uri="{FF2B5EF4-FFF2-40B4-BE49-F238E27FC236}">
+                <a16:creationId xmlns:a16="http://schemas.microsoft.com/office/drawing/2014/main" id="{21E0A102-43AA-4526-8ACB-2F594496473D}"/>
+              </a:ext>
+            </a:extLst>
+          </p:cNvPr>
+          <p:cNvSpPr/>
+          <p:nvPr/>
+        </p:nvSpPr>
+        <p:spPr>
+          <a:xfrm>
+            <a:off x="369116" y="4876450"/>
+            <a:ext cx="1308682" cy="645953"/>
+          </a:xfrm>
+          <a:prstGeom prst="roundRect">
+            <a:avLst/>
+          </a:prstGeom>
+        </p:spPr>
+        <p:style>
+          <a:lnRef idx="2">
+            <a:schemeClr val="accent1">
+              <a:shade val="50000"/>
+            </a:schemeClr>
+          </a:lnRef>
+          <a:fillRef idx="1">
+            <a:schemeClr val="accent1"/>
+          </a:fillRef>
+          <a:effectRef idx="0">
+            <a:schemeClr val="accent1"/>
+          </a:effectRef>
+          <a:fontRef idx="minor">
+            <a:schemeClr val="lt1"/>
+          </a:fontRef>
+        </p:style>
+        <p:txBody>
+          <a:bodyPr rtlCol="0" anchor="ctr"/>
+          <a:lstStyle/>
+          <a:p>
+            <a:pPr algn="ctr"/>
+            <a:r>
+              <a:rPr lang="en-US" dirty="0" err="1"/>
+              <a:t>OiAIp</a:t>
+            </a:r>
+            <a:endParaRPr lang="en-US" dirty="0"/>
           </a:p>
         </p:txBody>
       </p:sp>
@@ -4807,6 +5104,1064 @@
     <p:extLst>
       <p:ext uri="{BB962C8B-B14F-4D97-AF65-F5344CB8AC3E}">
         <p14:creationId xmlns:p14="http://schemas.microsoft.com/office/powerpoint/2010/main" val="988448541"/>
+      </p:ext>
+    </p:extLst>
+  </p:cSld>
+  <p:clrMapOvr>
+    <a:masterClrMapping/>
+  </p:clrMapOvr>
+</p:sld>
+</file>
+
+<file path=ppt/slides/slide4.xml><?xml version="1.0" encoding="utf-8"?>
+<p:sld xmlns:a="http://schemas.openxmlformats.org/drawingml/2006/main" xmlns:r="http://schemas.openxmlformats.org/officeDocument/2006/relationships" xmlns:p="http://schemas.openxmlformats.org/presentationml/2006/main">
+  <p:cSld>
+    <p:bg>
+      <p:bgPr>
+        <a:solidFill>
+          <a:schemeClr val="bg1"/>
+        </a:solidFill>
+        <a:effectLst/>
+      </p:bgPr>
+    </p:bg>
+    <p:spTree>
+      <p:nvGrpSpPr>
+        <p:cNvPr id="1" name=""/>
+        <p:cNvGrpSpPr/>
+        <p:nvPr/>
+      </p:nvGrpSpPr>
+      <p:grpSpPr>
+        <a:xfrm>
+          <a:off x="0" y="0"/>
+          <a:ext cx="0" cy="0"/>
+          <a:chOff x="0" y="0"/>
+          <a:chExt cx="0" cy="0"/>
+        </a:xfrm>
+      </p:grpSpPr>
+      <p:sp>
+        <p:nvSpPr>
+          <p:cNvPr id="9" name="Rectangle 8">
+            <a:extLst>
+              <a:ext uri="{FF2B5EF4-FFF2-40B4-BE49-F238E27FC236}">
+                <a16:creationId xmlns:a16="http://schemas.microsoft.com/office/drawing/2014/main" id="{DD651B61-325E-4E73-8445-38B0DE8AAAB6}"/>
+              </a:ext>
+              <a:ext uri="{C183D7F6-B498-43B3-948B-1728B52AA6E4}">
+                <adec:decorative xmlns:adec="http://schemas.microsoft.com/office/drawing/2017/decorative" val="1"/>
+              </a:ext>
+            </a:extLst>
+          </p:cNvPr>
+          <p:cNvSpPr>
+            <a:spLocks noGrp="1" noRot="1" noChangeAspect="1" noMove="1" noResize="1" noEditPoints="1" noAdjustHandles="1" noChangeArrowheads="1" noChangeShapeType="1" noTextEdit="1"/>
+          </p:cNvSpPr>
+          <p:nvPr>
+            <p:extLst>
+              <p:ext uri="{386F3935-93C4-4BCD-93E2-E3B085C9AB24}">
+                <p16:designElem xmlns:p16="http://schemas.microsoft.com/office/powerpoint/2015/main" val="1"/>
+              </p:ext>
+            </p:extLst>
+          </p:nvPr>
+        </p:nvSpPr>
+        <p:spPr>
+          <a:xfrm>
+            <a:off x="446534" y="457200"/>
+            <a:ext cx="3703320" cy="94997"/>
+          </a:xfrm>
+          <a:prstGeom prst="rect">
+            <a:avLst/>
+          </a:prstGeom>
+          <a:solidFill>
+            <a:srgbClr val="465359"/>
+          </a:solidFill>
+          <a:ln>
+            <a:noFill/>
+          </a:ln>
+          <a:effectLst/>
+        </p:spPr>
+        <p:style>
+          <a:lnRef idx="1">
+            <a:schemeClr val="accent1"/>
+          </a:lnRef>
+          <a:fillRef idx="3">
+            <a:schemeClr val="accent1"/>
+          </a:fillRef>
+          <a:effectRef idx="2">
+            <a:schemeClr val="accent1"/>
+          </a:effectRef>
+          <a:fontRef idx="minor">
+            <a:schemeClr val="lt1"/>
+          </a:fontRef>
+        </p:style>
+      </p:sp>
+      <p:sp>
+        <p:nvSpPr>
+          <p:cNvPr id="11" name="Rectangle 10">
+            <a:extLst>
+              <a:ext uri="{FF2B5EF4-FFF2-40B4-BE49-F238E27FC236}">
+                <a16:creationId xmlns:a16="http://schemas.microsoft.com/office/drawing/2014/main" id="{B42E5253-D3AC-4AC2-B766-8B34F13C2F5E}"/>
+              </a:ext>
+              <a:ext uri="{C183D7F6-B498-43B3-948B-1728B52AA6E4}">
+                <adec:decorative xmlns:adec="http://schemas.microsoft.com/office/drawing/2017/decorative" val="1"/>
+              </a:ext>
+            </a:extLst>
+          </p:cNvPr>
+          <p:cNvSpPr>
+            <a:spLocks noGrp="1" noRot="1" noChangeAspect="1" noMove="1" noResize="1" noEditPoints="1" noAdjustHandles="1" noChangeArrowheads="1" noChangeShapeType="1" noTextEdit="1"/>
+          </p:cNvSpPr>
+          <p:nvPr>
+            <p:extLst>
+              <p:ext uri="{386F3935-93C4-4BCD-93E2-E3B085C9AB24}">
+                <p16:designElem xmlns:p16="http://schemas.microsoft.com/office/powerpoint/2015/main" val="1"/>
+              </p:ext>
+            </p:extLst>
+          </p:nvPr>
+        </p:nvSpPr>
+        <p:spPr>
+          <a:xfrm>
+            <a:off x="8042147" y="453643"/>
+            <a:ext cx="3703320" cy="98554"/>
+          </a:xfrm>
+          <a:prstGeom prst="rect">
+            <a:avLst/>
+          </a:prstGeom>
+          <a:solidFill>
+            <a:srgbClr val="969FA7"/>
+          </a:solidFill>
+          <a:ln>
+            <a:noFill/>
+          </a:ln>
+          <a:effectLst/>
+        </p:spPr>
+        <p:style>
+          <a:lnRef idx="1">
+            <a:schemeClr val="accent1"/>
+          </a:lnRef>
+          <a:fillRef idx="3">
+            <a:schemeClr val="accent1"/>
+          </a:fillRef>
+          <a:effectRef idx="2">
+            <a:schemeClr val="accent1"/>
+          </a:effectRef>
+          <a:fontRef idx="minor">
+            <a:schemeClr val="lt1"/>
+          </a:fontRef>
+        </p:style>
+      </p:sp>
+      <p:sp>
+        <p:nvSpPr>
+          <p:cNvPr id="13" name="Rectangle 12">
+            <a:extLst>
+              <a:ext uri="{FF2B5EF4-FFF2-40B4-BE49-F238E27FC236}">
+                <a16:creationId xmlns:a16="http://schemas.microsoft.com/office/drawing/2014/main" id="{10AE8D57-436A-4073-9A75-15BB5949F8B4}"/>
+              </a:ext>
+              <a:ext uri="{C183D7F6-B498-43B3-948B-1728B52AA6E4}">
+                <adec:decorative xmlns:adec="http://schemas.microsoft.com/office/drawing/2017/decorative" val="1"/>
+              </a:ext>
+            </a:extLst>
+          </p:cNvPr>
+          <p:cNvSpPr>
+            <a:spLocks noGrp="1" noRot="1" noChangeAspect="1" noMove="1" noResize="1" noEditPoints="1" noAdjustHandles="1" noChangeArrowheads="1" noChangeShapeType="1" noTextEdit="1"/>
+          </p:cNvSpPr>
+          <p:nvPr>
+            <p:extLst>
+              <p:ext uri="{386F3935-93C4-4BCD-93E2-E3B085C9AB24}">
+                <p16:designElem xmlns:p16="http://schemas.microsoft.com/office/powerpoint/2015/main" val="1"/>
+              </p:ext>
+            </p:extLst>
+          </p:nvPr>
+        </p:nvSpPr>
+        <p:spPr>
+          <a:xfrm>
+            <a:off x="4241830" y="457200"/>
+            <a:ext cx="3703320" cy="91440"/>
+          </a:xfrm>
+          <a:prstGeom prst="rect">
+            <a:avLst/>
+          </a:prstGeom>
+          <a:solidFill>
+            <a:schemeClr val="accent1"/>
+          </a:solidFill>
+          <a:ln>
+            <a:noFill/>
+          </a:ln>
+          <a:effectLst/>
+        </p:spPr>
+        <p:style>
+          <a:lnRef idx="1">
+            <a:schemeClr val="accent1"/>
+          </a:lnRef>
+          <a:fillRef idx="3">
+            <a:schemeClr val="accent1"/>
+          </a:fillRef>
+          <a:effectRef idx="2">
+            <a:schemeClr val="accent1"/>
+          </a:effectRef>
+          <a:fontRef idx="minor">
+            <a:schemeClr val="lt1"/>
+          </a:fontRef>
+        </p:style>
+      </p:sp>
+      <p:sp>
+        <p:nvSpPr>
+          <p:cNvPr id="15" name="Rectangle 14">
+            <a:extLst>
+              <a:ext uri="{FF2B5EF4-FFF2-40B4-BE49-F238E27FC236}">
+                <a16:creationId xmlns:a16="http://schemas.microsoft.com/office/drawing/2014/main" id="{E2852671-8EB6-4EAF-8AF8-65CF3FD66456}"/>
+              </a:ext>
+              <a:ext uri="{C183D7F6-B498-43B3-948B-1728B52AA6E4}">
+                <adec:decorative xmlns:adec="http://schemas.microsoft.com/office/drawing/2017/decorative" val="1"/>
+              </a:ext>
+            </a:extLst>
+          </p:cNvPr>
+          <p:cNvSpPr>
+            <a:spLocks noGrp="1" noRot="1" noChangeAspect="1" noMove="1" noResize="1" noEditPoints="1" noAdjustHandles="1" noChangeArrowheads="1" noChangeShapeType="1" noTextEdit="1"/>
+          </p:cNvSpPr>
+          <p:nvPr>
+            <p:extLst>
+              <p:ext uri="{386F3935-93C4-4BCD-93E2-E3B085C9AB24}">
+                <p16:designElem xmlns:p16="http://schemas.microsoft.com/office/powerpoint/2015/main" val="1"/>
+              </p:ext>
+            </p:extLst>
+          </p:nvPr>
+        </p:nvSpPr>
+        <p:spPr>
+          <a:xfrm>
+            <a:off x="446534" y="3085764"/>
+            <a:ext cx="11298932" cy="3338149"/>
+          </a:xfrm>
+          <a:prstGeom prst="rect">
+            <a:avLst/>
+          </a:prstGeom>
+          <a:solidFill>
+            <a:srgbClr val="465359"/>
+          </a:solidFill>
+          <a:ln>
+            <a:noFill/>
+          </a:ln>
+          <a:effectLst/>
+        </p:spPr>
+        <p:style>
+          <a:lnRef idx="1">
+            <a:schemeClr val="accent1"/>
+          </a:lnRef>
+          <a:fillRef idx="3">
+            <a:schemeClr val="accent1"/>
+          </a:fillRef>
+          <a:effectRef idx="2">
+            <a:schemeClr val="accent1"/>
+          </a:effectRef>
+          <a:fontRef idx="minor">
+            <a:schemeClr val="lt1"/>
+          </a:fontRef>
+        </p:style>
+      </p:sp>
+      <p:sp useBgFill="1">
+        <p:nvSpPr>
+          <p:cNvPr id="17" name="Rectangle 16">
+            <a:extLst>
+              <a:ext uri="{FF2B5EF4-FFF2-40B4-BE49-F238E27FC236}">
+                <a16:creationId xmlns:a16="http://schemas.microsoft.com/office/drawing/2014/main" id="{26B4480E-B7FF-4481-890E-043A69AE6FE2}"/>
+              </a:ext>
+              <a:ext uri="{C183D7F6-B498-43B3-948B-1728B52AA6E4}">
+                <adec:decorative xmlns:adec="http://schemas.microsoft.com/office/drawing/2017/decorative" val="1"/>
+              </a:ext>
+            </a:extLst>
+          </p:cNvPr>
+          <p:cNvSpPr>
+            <a:spLocks noGrp="1" noRot="1" noChangeAspect="1" noMove="1" noResize="1" noEditPoints="1" noAdjustHandles="1" noChangeArrowheads="1" noChangeShapeType="1" noTextEdit="1"/>
+          </p:cNvSpPr>
+          <p:nvPr>
+            <p:extLst>
+              <p:ext uri="{386F3935-93C4-4BCD-93E2-E3B085C9AB24}">
+                <p16:designElem xmlns:p16="http://schemas.microsoft.com/office/powerpoint/2015/main" val="1"/>
+              </p:ext>
+            </p:extLst>
+          </p:nvPr>
+        </p:nvSpPr>
+        <p:spPr>
+          <a:xfrm>
+            <a:off x="0" y="0"/>
+            <a:ext cx="12192000" cy="6858000"/>
+          </a:xfrm>
+          <a:prstGeom prst="rect">
+            <a:avLst/>
+          </a:prstGeom>
+          <a:ln>
+            <a:noFill/>
+          </a:ln>
+        </p:spPr>
+        <p:style>
+          <a:lnRef idx="2">
+            <a:schemeClr val="accent1">
+              <a:shade val="50000"/>
+            </a:schemeClr>
+          </a:lnRef>
+          <a:fillRef idx="1">
+            <a:schemeClr val="accent1"/>
+          </a:fillRef>
+          <a:effectRef idx="0">
+            <a:schemeClr val="accent1"/>
+          </a:effectRef>
+          <a:fontRef idx="minor">
+            <a:schemeClr val="lt1"/>
+          </a:fontRef>
+        </p:style>
+        <p:txBody>
+          <a:bodyPr rtlCol="0" anchor="ctr"/>
+          <a:lstStyle/>
+          <a:p>
+            <a:pPr algn="ctr"/>
+            <a:endParaRPr lang="en-US"/>
+          </a:p>
+        </p:txBody>
+      </p:sp>
+      <p:grpSp>
+        <p:nvGrpSpPr>
+          <p:cNvPr id="19" name="Group 18">
+            <a:extLst>
+              <a:ext uri="{FF2B5EF4-FFF2-40B4-BE49-F238E27FC236}">
+                <a16:creationId xmlns:a16="http://schemas.microsoft.com/office/drawing/2014/main" id="{79394E1F-0B5F-497D-B2A6-8383A2A54834}"/>
+              </a:ext>
+              <a:ext uri="{C183D7F6-B498-43B3-948B-1728B52AA6E4}">
+                <adec:decorative xmlns:adec="http://schemas.microsoft.com/office/drawing/2017/decorative" val="1"/>
+              </a:ext>
+            </a:extLst>
+          </p:cNvPr>
+          <p:cNvGrpSpPr>
+            <a:grpSpLocks noGrp="1" noUngrp="1" noRot="1" noChangeAspect="1" noMove="1" noResize="1"/>
+          </p:cNvGrpSpPr>
+          <p:nvPr>
+            <p:extLst>
+              <p:ext uri="{386F3935-93C4-4BCD-93E2-E3B085C9AB24}">
+                <p16:designElem xmlns:p16="http://schemas.microsoft.com/office/powerpoint/2015/main" val="1"/>
+              </p:ext>
+            </p:extLst>
+          </p:nvPr>
+        </p:nvGrpSpPr>
+        <p:grpSpPr>
+          <a:xfrm>
+            <a:off x="438068" y="457200"/>
+            <a:ext cx="3703320" cy="5935133"/>
+            <a:chOff x="438068" y="457200"/>
+            <a:chExt cx="3703320" cy="5935133"/>
+          </a:xfrm>
+        </p:grpSpPr>
+        <p:sp>
+          <p:nvSpPr>
+            <p:cNvPr id="20" name="Rectangle 19">
+              <a:extLst>
+                <a:ext uri="{FF2B5EF4-FFF2-40B4-BE49-F238E27FC236}">
+                  <a16:creationId xmlns:a16="http://schemas.microsoft.com/office/drawing/2014/main" id="{1F1FF39A-AC3C-4066-9D4C-519AA22812EA}"/>
+                </a:ext>
+                <a:ext uri="{C183D7F6-B498-43B3-948B-1728B52AA6E4}">
+                  <adec:decorative xmlns:adec="http://schemas.microsoft.com/office/drawing/2017/decorative" val="1"/>
+                </a:ext>
+              </a:extLst>
+            </p:cNvPr>
+            <p:cNvSpPr/>
+            <p:nvPr>
+              <p:extLst>
+                <p:ext uri="{386F3935-93C4-4BCD-93E2-E3B085C9AB24}">
+                  <p16:designElem xmlns:p16="http://schemas.microsoft.com/office/powerpoint/2015/main" val="1"/>
+                </p:ext>
+              </p:extLst>
+            </p:nvPr>
+          </p:nvSpPr>
+          <p:spPr>
+            <a:xfrm>
+              <a:off x="438068" y="601201"/>
+              <a:ext cx="3702134" cy="5791132"/>
+            </a:xfrm>
+            <a:prstGeom prst="rect">
+              <a:avLst/>
+            </a:prstGeom>
+            <a:solidFill>
+              <a:srgbClr val="465359">
+                <a:alpha val="97000"/>
+              </a:srgbClr>
+            </a:solidFill>
+            <a:ln w="6350" cmpd="sng">
+              <a:noFill/>
+            </a:ln>
+            <a:effectLst/>
+          </p:spPr>
+          <p:style>
+            <a:lnRef idx="1">
+              <a:schemeClr val="accent1"/>
+            </a:lnRef>
+            <a:fillRef idx="3">
+              <a:schemeClr val="accent1"/>
+            </a:fillRef>
+            <a:effectRef idx="2">
+              <a:schemeClr val="accent1"/>
+            </a:effectRef>
+            <a:fontRef idx="minor">
+              <a:schemeClr val="lt1"/>
+            </a:fontRef>
+          </p:style>
+        </p:sp>
+        <p:sp>
+          <p:nvSpPr>
+            <p:cNvPr id="21" name="Rectangle 20">
+              <a:extLst>
+                <a:ext uri="{FF2B5EF4-FFF2-40B4-BE49-F238E27FC236}">
+                  <a16:creationId xmlns:a16="http://schemas.microsoft.com/office/drawing/2014/main" id="{64C13BAB-7C00-4D21-A857-E3D41C0A2A66}"/>
+                </a:ext>
+                <a:ext uri="{C183D7F6-B498-43B3-948B-1728B52AA6E4}">
+                  <adec:decorative xmlns:adec="http://schemas.microsoft.com/office/drawing/2017/decorative" val="1"/>
+                </a:ext>
+              </a:extLst>
+            </p:cNvPr>
+            <p:cNvSpPr/>
+            <p:nvPr>
+              <p:extLst>
+                <p:ext uri="{386F3935-93C4-4BCD-93E2-E3B085C9AB24}">
+                  <p16:designElem xmlns:p16="http://schemas.microsoft.com/office/powerpoint/2015/main" val="1"/>
+                </p:ext>
+              </p:extLst>
+            </p:nvPr>
+          </p:nvSpPr>
+          <p:spPr>
+            <a:xfrm>
+              <a:off x="438068" y="457200"/>
+              <a:ext cx="3703320" cy="94997"/>
+            </a:xfrm>
+            <a:prstGeom prst="rect">
+              <a:avLst/>
+            </a:prstGeom>
+            <a:solidFill>
+              <a:srgbClr val="465359"/>
+            </a:solidFill>
+            <a:ln>
+              <a:noFill/>
+            </a:ln>
+            <a:effectLst/>
+          </p:spPr>
+          <p:style>
+            <a:lnRef idx="1">
+              <a:schemeClr val="accent1"/>
+            </a:lnRef>
+            <a:fillRef idx="3">
+              <a:schemeClr val="accent1"/>
+            </a:fillRef>
+            <a:effectRef idx="2">
+              <a:schemeClr val="accent1"/>
+            </a:effectRef>
+            <a:fontRef idx="minor">
+              <a:schemeClr val="lt1"/>
+            </a:fontRef>
+          </p:style>
+        </p:sp>
+      </p:grpSp>
+      <p:sp>
+        <p:nvSpPr>
+          <p:cNvPr id="2" name="Title 1">
+            <a:extLst>
+              <a:ext uri="{FF2B5EF4-FFF2-40B4-BE49-F238E27FC236}">
+                <a16:creationId xmlns:a16="http://schemas.microsoft.com/office/drawing/2014/main" id="{08059056-8985-42C8-B832-F68E4FF2143C}"/>
+              </a:ext>
+            </a:extLst>
+          </p:cNvPr>
+          <p:cNvSpPr>
+            <a:spLocks noGrp="1"/>
+          </p:cNvSpPr>
+          <p:nvPr>
+            <p:ph type="title"/>
+          </p:nvPr>
+        </p:nvSpPr>
+        <p:spPr>
+          <a:xfrm>
+            <a:off x="584200" y="1524001"/>
+            <a:ext cx="3412067" cy="3478384"/>
+          </a:xfrm>
+        </p:spPr>
+        <p:txBody>
+          <a:bodyPr vert="horz" lIns="91440" tIns="45720" rIns="91440" bIns="45720" rtlCol="0" anchor="b">
+            <a:normAutofit/>
+          </a:bodyPr>
+          <a:lstStyle/>
+          <a:p>
+            <a:r>
+              <a:rPr lang="en-US" sz="3600">
+                <a:solidFill>
+                  <a:srgbClr val="FFFFFF"/>
+                </a:solidFill>
+              </a:rPr>
+              <a:t>OIAIP Admin - iPack Registration Mock Up</a:t>
+            </a:r>
+          </a:p>
+        </p:txBody>
+      </p:sp>
+      <p:pic>
+        <p:nvPicPr>
+          <p:cNvPr id="4" name="Picture 3">
+            <a:extLst>
+              <a:ext uri="{FF2B5EF4-FFF2-40B4-BE49-F238E27FC236}">
+                <a16:creationId xmlns:a16="http://schemas.microsoft.com/office/drawing/2014/main" id="{3719A0C4-06D3-49C8-9AE3-575D65B8E08D}"/>
+              </a:ext>
+            </a:extLst>
+          </p:cNvPr>
+          <p:cNvPicPr>
+            <a:picLocks noChangeAspect="1"/>
+          </p:cNvPicPr>
+          <p:nvPr/>
+        </p:nvPicPr>
+        <p:blipFill>
+          <a:blip r:embed="rId2"/>
+          <a:stretch>
+            <a:fillRect/>
+          </a:stretch>
+        </p:blipFill>
+        <p:spPr>
+          <a:xfrm>
+            <a:off x="4765053" y="914146"/>
+            <a:ext cx="6764864" cy="5005999"/>
+          </a:xfrm>
+          <a:prstGeom prst="rect">
+            <a:avLst/>
+          </a:prstGeom>
+        </p:spPr>
+      </p:pic>
+    </p:spTree>
+    <p:extLst>
+      <p:ext uri="{BB962C8B-B14F-4D97-AF65-F5344CB8AC3E}">
+        <p14:creationId xmlns:p14="http://schemas.microsoft.com/office/powerpoint/2010/main" val="3481154793"/>
+      </p:ext>
+    </p:extLst>
+  </p:cSld>
+  <p:clrMapOvr>
+    <a:masterClrMapping/>
+  </p:clrMapOvr>
+</p:sld>
+</file>
+
+<file path=ppt/slides/slide5.xml><?xml version="1.0" encoding="utf-8"?>
+<p:sld xmlns:a="http://schemas.openxmlformats.org/drawingml/2006/main" xmlns:r="http://schemas.openxmlformats.org/officeDocument/2006/relationships" xmlns:p="http://schemas.openxmlformats.org/presentationml/2006/main">
+  <p:cSld>
+    <p:bg>
+      <p:bgPr>
+        <a:solidFill>
+          <a:schemeClr val="bg1"/>
+        </a:solidFill>
+        <a:effectLst/>
+      </p:bgPr>
+    </p:bg>
+    <p:spTree>
+      <p:nvGrpSpPr>
+        <p:cNvPr id="1" name=""/>
+        <p:cNvGrpSpPr/>
+        <p:nvPr/>
+      </p:nvGrpSpPr>
+      <p:grpSpPr>
+        <a:xfrm>
+          <a:off x="0" y="0"/>
+          <a:ext cx="0" cy="0"/>
+          <a:chOff x="0" y="0"/>
+          <a:chExt cx="0" cy="0"/>
+        </a:xfrm>
+      </p:grpSpPr>
+      <p:sp>
+        <p:nvSpPr>
+          <p:cNvPr id="9" name="Rectangle 8">
+            <a:extLst>
+              <a:ext uri="{FF2B5EF4-FFF2-40B4-BE49-F238E27FC236}">
+                <a16:creationId xmlns:a16="http://schemas.microsoft.com/office/drawing/2014/main" id="{DD651B61-325E-4E73-8445-38B0DE8AAAB6}"/>
+              </a:ext>
+              <a:ext uri="{C183D7F6-B498-43B3-948B-1728B52AA6E4}">
+                <adec:decorative xmlns:adec="http://schemas.microsoft.com/office/drawing/2017/decorative" val="1"/>
+              </a:ext>
+            </a:extLst>
+          </p:cNvPr>
+          <p:cNvSpPr>
+            <a:spLocks noGrp="1" noRot="1" noChangeAspect="1" noMove="1" noResize="1" noEditPoints="1" noAdjustHandles="1" noChangeArrowheads="1" noChangeShapeType="1" noTextEdit="1"/>
+          </p:cNvSpPr>
+          <p:nvPr>
+            <p:extLst>
+              <p:ext uri="{386F3935-93C4-4BCD-93E2-E3B085C9AB24}">
+                <p16:designElem xmlns:p16="http://schemas.microsoft.com/office/powerpoint/2015/main" val="1"/>
+              </p:ext>
+            </p:extLst>
+          </p:nvPr>
+        </p:nvSpPr>
+        <p:spPr>
+          <a:xfrm>
+            <a:off x="446534" y="457200"/>
+            <a:ext cx="3703320" cy="94997"/>
+          </a:xfrm>
+          <a:prstGeom prst="rect">
+            <a:avLst/>
+          </a:prstGeom>
+          <a:solidFill>
+            <a:srgbClr val="465359"/>
+          </a:solidFill>
+          <a:ln>
+            <a:noFill/>
+          </a:ln>
+          <a:effectLst/>
+        </p:spPr>
+        <p:style>
+          <a:lnRef idx="1">
+            <a:schemeClr val="accent1"/>
+          </a:lnRef>
+          <a:fillRef idx="3">
+            <a:schemeClr val="accent1"/>
+          </a:fillRef>
+          <a:effectRef idx="2">
+            <a:schemeClr val="accent1"/>
+          </a:effectRef>
+          <a:fontRef idx="minor">
+            <a:schemeClr val="lt1"/>
+          </a:fontRef>
+        </p:style>
+      </p:sp>
+      <p:sp>
+        <p:nvSpPr>
+          <p:cNvPr id="11" name="Rectangle 10">
+            <a:extLst>
+              <a:ext uri="{FF2B5EF4-FFF2-40B4-BE49-F238E27FC236}">
+                <a16:creationId xmlns:a16="http://schemas.microsoft.com/office/drawing/2014/main" id="{B42E5253-D3AC-4AC2-B766-8B34F13C2F5E}"/>
+              </a:ext>
+              <a:ext uri="{C183D7F6-B498-43B3-948B-1728B52AA6E4}">
+                <adec:decorative xmlns:adec="http://schemas.microsoft.com/office/drawing/2017/decorative" val="1"/>
+              </a:ext>
+            </a:extLst>
+          </p:cNvPr>
+          <p:cNvSpPr>
+            <a:spLocks noGrp="1" noRot="1" noChangeAspect="1" noMove="1" noResize="1" noEditPoints="1" noAdjustHandles="1" noChangeArrowheads="1" noChangeShapeType="1" noTextEdit="1"/>
+          </p:cNvSpPr>
+          <p:nvPr>
+            <p:extLst>
+              <p:ext uri="{386F3935-93C4-4BCD-93E2-E3B085C9AB24}">
+                <p16:designElem xmlns:p16="http://schemas.microsoft.com/office/powerpoint/2015/main" val="1"/>
+              </p:ext>
+            </p:extLst>
+          </p:nvPr>
+        </p:nvSpPr>
+        <p:spPr>
+          <a:xfrm>
+            <a:off x="8042147" y="453643"/>
+            <a:ext cx="3703320" cy="98554"/>
+          </a:xfrm>
+          <a:prstGeom prst="rect">
+            <a:avLst/>
+          </a:prstGeom>
+          <a:solidFill>
+            <a:srgbClr val="969FA7"/>
+          </a:solidFill>
+          <a:ln>
+            <a:noFill/>
+          </a:ln>
+          <a:effectLst/>
+        </p:spPr>
+        <p:style>
+          <a:lnRef idx="1">
+            <a:schemeClr val="accent1"/>
+          </a:lnRef>
+          <a:fillRef idx="3">
+            <a:schemeClr val="accent1"/>
+          </a:fillRef>
+          <a:effectRef idx="2">
+            <a:schemeClr val="accent1"/>
+          </a:effectRef>
+          <a:fontRef idx="minor">
+            <a:schemeClr val="lt1"/>
+          </a:fontRef>
+        </p:style>
+      </p:sp>
+      <p:sp>
+        <p:nvSpPr>
+          <p:cNvPr id="13" name="Rectangle 12">
+            <a:extLst>
+              <a:ext uri="{FF2B5EF4-FFF2-40B4-BE49-F238E27FC236}">
+                <a16:creationId xmlns:a16="http://schemas.microsoft.com/office/drawing/2014/main" id="{10AE8D57-436A-4073-9A75-15BB5949F8B4}"/>
+              </a:ext>
+              <a:ext uri="{C183D7F6-B498-43B3-948B-1728B52AA6E4}">
+                <adec:decorative xmlns:adec="http://schemas.microsoft.com/office/drawing/2017/decorative" val="1"/>
+              </a:ext>
+            </a:extLst>
+          </p:cNvPr>
+          <p:cNvSpPr>
+            <a:spLocks noGrp="1" noRot="1" noChangeAspect="1" noMove="1" noResize="1" noEditPoints="1" noAdjustHandles="1" noChangeArrowheads="1" noChangeShapeType="1" noTextEdit="1"/>
+          </p:cNvSpPr>
+          <p:nvPr>
+            <p:extLst>
+              <p:ext uri="{386F3935-93C4-4BCD-93E2-E3B085C9AB24}">
+                <p16:designElem xmlns:p16="http://schemas.microsoft.com/office/powerpoint/2015/main" val="1"/>
+              </p:ext>
+            </p:extLst>
+          </p:nvPr>
+        </p:nvSpPr>
+        <p:spPr>
+          <a:xfrm>
+            <a:off x="4241830" y="457200"/>
+            <a:ext cx="3703320" cy="91440"/>
+          </a:xfrm>
+          <a:prstGeom prst="rect">
+            <a:avLst/>
+          </a:prstGeom>
+          <a:solidFill>
+            <a:schemeClr val="accent1"/>
+          </a:solidFill>
+          <a:ln>
+            <a:noFill/>
+          </a:ln>
+          <a:effectLst/>
+        </p:spPr>
+        <p:style>
+          <a:lnRef idx="1">
+            <a:schemeClr val="accent1"/>
+          </a:lnRef>
+          <a:fillRef idx="3">
+            <a:schemeClr val="accent1"/>
+          </a:fillRef>
+          <a:effectRef idx="2">
+            <a:schemeClr val="accent1"/>
+          </a:effectRef>
+          <a:fontRef idx="minor">
+            <a:schemeClr val="lt1"/>
+          </a:fontRef>
+        </p:style>
+      </p:sp>
+      <p:sp>
+        <p:nvSpPr>
+          <p:cNvPr id="15" name="Rectangle 14">
+            <a:extLst>
+              <a:ext uri="{FF2B5EF4-FFF2-40B4-BE49-F238E27FC236}">
+                <a16:creationId xmlns:a16="http://schemas.microsoft.com/office/drawing/2014/main" id="{E2852671-8EB6-4EAF-8AF8-65CF3FD66456}"/>
+              </a:ext>
+              <a:ext uri="{C183D7F6-B498-43B3-948B-1728B52AA6E4}">
+                <adec:decorative xmlns:adec="http://schemas.microsoft.com/office/drawing/2017/decorative" val="1"/>
+              </a:ext>
+            </a:extLst>
+          </p:cNvPr>
+          <p:cNvSpPr>
+            <a:spLocks noGrp="1" noRot="1" noChangeAspect="1" noMove="1" noResize="1" noEditPoints="1" noAdjustHandles="1" noChangeArrowheads="1" noChangeShapeType="1" noTextEdit="1"/>
+          </p:cNvSpPr>
+          <p:nvPr>
+            <p:extLst>
+              <p:ext uri="{386F3935-93C4-4BCD-93E2-E3B085C9AB24}">
+                <p16:designElem xmlns:p16="http://schemas.microsoft.com/office/powerpoint/2015/main" val="1"/>
+              </p:ext>
+            </p:extLst>
+          </p:nvPr>
+        </p:nvSpPr>
+        <p:spPr>
+          <a:xfrm>
+            <a:off x="446534" y="3085764"/>
+            <a:ext cx="11298932" cy="3338149"/>
+          </a:xfrm>
+          <a:prstGeom prst="rect">
+            <a:avLst/>
+          </a:prstGeom>
+          <a:solidFill>
+            <a:srgbClr val="465359"/>
+          </a:solidFill>
+          <a:ln>
+            <a:noFill/>
+          </a:ln>
+          <a:effectLst/>
+        </p:spPr>
+        <p:style>
+          <a:lnRef idx="1">
+            <a:schemeClr val="accent1"/>
+          </a:lnRef>
+          <a:fillRef idx="3">
+            <a:schemeClr val="accent1"/>
+          </a:fillRef>
+          <a:effectRef idx="2">
+            <a:schemeClr val="accent1"/>
+          </a:effectRef>
+          <a:fontRef idx="minor">
+            <a:schemeClr val="lt1"/>
+          </a:fontRef>
+        </p:style>
+      </p:sp>
+      <p:sp useBgFill="1">
+        <p:nvSpPr>
+          <p:cNvPr id="17" name="Rectangle 16">
+            <a:extLst>
+              <a:ext uri="{FF2B5EF4-FFF2-40B4-BE49-F238E27FC236}">
+                <a16:creationId xmlns:a16="http://schemas.microsoft.com/office/drawing/2014/main" id="{26B4480E-B7FF-4481-890E-043A69AE6FE2}"/>
+              </a:ext>
+              <a:ext uri="{C183D7F6-B498-43B3-948B-1728B52AA6E4}">
+                <adec:decorative xmlns:adec="http://schemas.microsoft.com/office/drawing/2017/decorative" val="1"/>
+              </a:ext>
+            </a:extLst>
+          </p:cNvPr>
+          <p:cNvSpPr>
+            <a:spLocks noGrp="1" noRot="1" noChangeAspect="1" noMove="1" noResize="1" noEditPoints="1" noAdjustHandles="1" noChangeArrowheads="1" noChangeShapeType="1" noTextEdit="1"/>
+          </p:cNvSpPr>
+          <p:nvPr>
+            <p:extLst>
+              <p:ext uri="{386F3935-93C4-4BCD-93E2-E3B085C9AB24}">
+                <p16:designElem xmlns:p16="http://schemas.microsoft.com/office/powerpoint/2015/main" val="1"/>
+              </p:ext>
+            </p:extLst>
+          </p:nvPr>
+        </p:nvSpPr>
+        <p:spPr>
+          <a:xfrm>
+            <a:off x="0" y="0"/>
+            <a:ext cx="12192000" cy="6858000"/>
+          </a:xfrm>
+          <a:prstGeom prst="rect">
+            <a:avLst/>
+          </a:prstGeom>
+          <a:ln>
+            <a:noFill/>
+          </a:ln>
+        </p:spPr>
+        <p:style>
+          <a:lnRef idx="2">
+            <a:schemeClr val="accent1">
+              <a:shade val="50000"/>
+            </a:schemeClr>
+          </a:lnRef>
+          <a:fillRef idx="1">
+            <a:schemeClr val="accent1"/>
+          </a:fillRef>
+          <a:effectRef idx="0">
+            <a:schemeClr val="accent1"/>
+          </a:effectRef>
+          <a:fontRef idx="minor">
+            <a:schemeClr val="lt1"/>
+          </a:fontRef>
+        </p:style>
+        <p:txBody>
+          <a:bodyPr rtlCol="0" anchor="ctr"/>
+          <a:lstStyle/>
+          <a:p>
+            <a:pPr algn="ctr"/>
+            <a:endParaRPr lang="en-US"/>
+          </a:p>
+        </p:txBody>
+      </p:sp>
+      <p:grpSp>
+        <p:nvGrpSpPr>
+          <p:cNvPr id="19" name="Group 18">
+            <a:extLst>
+              <a:ext uri="{FF2B5EF4-FFF2-40B4-BE49-F238E27FC236}">
+                <a16:creationId xmlns:a16="http://schemas.microsoft.com/office/drawing/2014/main" id="{79394E1F-0B5F-497D-B2A6-8383A2A54834}"/>
+              </a:ext>
+              <a:ext uri="{C183D7F6-B498-43B3-948B-1728B52AA6E4}">
+                <adec:decorative xmlns:adec="http://schemas.microsoft.com/office/drawing/2017/decorative" val="1"/>
+              </a:ext>
+            </a:extLst>
+          </p:cNvPr>
+          <p:cNvGrpSpPr>
+            <a:grpSpLocks noGrp="1" noUngrp="1" noRot="1" noChangeAspect="1" noMove="1" noResize="1"/>
+          </p:cNvGrpSpPr>
+          <p:nvPr>
+            <p:extLst>
+              <p:ext uri="{386F3935-93C4-4BCD-93E2-E3B085C9AB24}">
+                <p16:designElem xmlns:p16="http://schemas.microsoft.com/office/powerpoint/2015/main" val="1"/>
+              </p:ext>
+            </p:extLst>
+          </p:nvPr>
+        </p:nvGrpSpPr>
+        <p:grpSpPr>
+          <a:xfrm>
+            <a:off x="438068" y="457200"/>
+            <a:ext cx="3703320" cy="5935133"/>
+            <a:chOff x="438068" y="457200"/>
+            <a:chExt cx="3703320" cy="5935133"/>
+          </a:xfrm>
+        </p:grpSpPr>
+        <p:sp>
+          <p:nvSpPr>
+            <p:cNvPr id="20" name="Rectangle 19">
+              <a:extLst>
+                <a:ext uri="{FF2B5EF4-FFF2-40B4-BE49-F238E27FC236}">
+                  <a16:creationId xmlns:a16="http://schemas.microsoft.com/office/drawing/2014/main" id="{1F1FF39A-AC3C-4066-9D4C-519AA22812EA}"/>
+                </a:ext>
+                <a:ext uri="{C183D7F6-B498-43B3-948B-1728B52AA6E4}">
+                  <adec:decorative xmlns:adec="http://schemas.microsoft.com/office/drawing/2017/decorative" val="1"/>
+                </a:ext>
+              </a:extLst>
+            </p:cNvPr>
+            <p:cNvSpPr/>
+            <p:nvPr>
+              <p:extLst>
+                <p:ext uri="{386F3935-93C4-4BCD-93E2-E3B085C9AB24}">
+                  <p16:designElem xmlns:p16="http://schemas.microsoft.com/office/powerpoint/2015/main" val="1"/>
+                </p:ext>
+              </p:extLst>
+            </p:nvPr>
+          </p:nvSpPr>
+          <p:spPr>
+            <a:xfrm>
+              <a:off x="438068" y="601201"/>
+              <a:ext cx="3702134" cy="5791132"/>
+            </a:xfrm>
+            <a:prstGeom prst="rect">
+              <a:avLst/>
+            </a:prstGeom>
+            <a:solidFill>
+              <a:srgbClr val="465359">
+                <a:alpha val="97000"/>
+              </a:srgbClr>
+            </a:solidFill>
+            <a:ln w="6350" cmpd="sng">
+              <a:noFill/>
+            </a:ln>
+            <a:effectLst/>
+          </p:spPr>
+          <p:style>
+            <a:lnRef idx="1">
+              <a:schemeClr val="accent1"/>
+            </a:lnRef>
+            <a:fillRef idx="3">
+              <a:schemeClr val="accent1"/>
+            </a:fillRef>
+            <a:effectRef idx="2">
+              <a:schemeClr val="accent1"/>
+            </a:effectRef>
+            <a:fontRef idx="minor">
+              <a:schemeClr val="lt1"/>
+            </a:fontRef>
+          </p:style>
+        </p:sp>
+        <p:sp>
+          <p:nvSpPr>
+            <p:cNvPr id="21" name="Rectangle 20">
+              <a:extLst>
+                <a:ext uri="{FF2B5EF4-FFF2-40B4-BE49-F238E27FC236}">
+                  <a16:creationId xmlns:a16="http://schemas.microsoft.com/office/drawing/2014/main" id="{64C13BAB-7C00-4D21-A857-E3D41C0A2A66}"/>
+                </a:ext>
+                <a:ext uri="{C183D7F6-B498-43B3-948B-1728B52AA6E4}">
+                  <adec:decorative xmlns:adec="http://schemas.microsoft.com/office/drawing/2017/decorative" val="1"/>
+                </a:ext>
+              </a:extLst>
+            </p:cNvPr>
+            <p:cNvSpPr/>
+            <p:nvPr>
+              <p:extLst>
+                <p:ext uri="{386F3935-93C4-4BCD-93E2-E3B085C9AB24}">
+                  <p16:designElem xmlns:p16="http://schemas.microsoft.com/office/powerpoint/2015/main" val="1"/>
+                </p:ext>
+              </p:extLst>
+            </p:nvPr>
+          </p:nvSpPr>
+          <p:spPr>
+            <a:xfrm>
+              <a:off x="438068" y="457200"/>
+              <a:ext cx="3703320" cy="94997"/>
+            </a:xfrm>
+            <a:prstGeom prst="rect">
+              <a:avLst/>
+            </a:prstGeom>
+            <a:solidFill>
+              <a:srgbClr val="465359"/>
+            </a:solidFill>
+            <a:ln>
+              <a:noFill/>
+            </a:ln>
+            <a:effectLst/>
+          </p:spPr>
+          <p:style>
+            <a:lnRef idx="1">
+              <a:schemeClr val="accent1"/>
+            </a:lnRef>
+            <a:fillRef idx="3">
+              <a:schemeClr val="accent1"/>
+            </a:fillRef>
+            <a:effectRef idx="2">
+              <a:schemeClr val="accent1"/>
+            </a:effectRef>
+            <a:fontRef idx="minor">
+              <a:schemeClr val="lt1"/>
+            </a:fontRef>
+          </p:style>
+        </p:sp>
+      </p:grpSp>
+      <p:sp>
+        <p:nvSpPr>
+          <p:cNvPr id="2" name="Title 1">
+            <a:extLst>
+              <a:ext uri="{FF2B5EF4-FFF2-40B4-BE49-F238E27FC236}">
+                <a16:creationId xmlns:a16="http://schemas.microsoft.com/office/drawing/2014/main" id="{2A555D88-505F-40F5-9DEA-D996CD06A241}"/>
+              </a:ext>
+            </a:extLst>
+          </p:cNvPr>
+          <p:cNvSpPr>
+            <a:spLocks noGrp="1"/>
+          </p:cNvSpPr>
+          <p:nvPr>
+            <p:ph type="title"/>
+          </p:nvPr>
+        </p:nvSpPr>
+        <p:spPr>
+          <a:xfrm>
+            <a:off x="584200" y="1524001"/>
+            <a:ext cx="3412067" cy="3478384"/>
+          </a:xfrm>
+        </p:spPr>
+        <p:txBody>
+          <a:bodyPr vert="horz" lIns="91440" tIns="45720" rIns="91440" bIns="45720" rtlCol="0" anchor="b">
+            <a:normAutofit/>
+          </a:bodyPr>
+          <a:lstStyle/>
+          <a:p>
+            <a:r>
+              <a:rPr lang="en-US" sz="3600" dirty="0">
+                <a:solidFill>
+                  <a:srgbClr val="FFFFFF"/>
+                </a:solidFill>
+              </a:rPr>
+              <a:t>Initial </a:t>
+            </a:r>
+            <a:r>
+              <a:rPr lang="en-US" sz="3600" dirty="0" err="1">
+                <a:solidFill>
+                  <a:srgbClr val="FFFFFF"/>
+                </a:solidFill>
+              </a:rPr>
+              <a:t>iPack</a:t>
+            </a:r>
+            <a:r>
+              <a:rPr lang="en-US" sz="3600" dirty="0">
+                <a:solidFill>
+                  <a:srgbClr val="FFFFFF"/>
+                </a:solidFill>
+              </a:rPr>
+              <a:t> Mock Up</a:t>
+            </a:r>
+          </a:p>
+        </p:txBody>
+      </p:sp>
+      <p:pic>
+        <p:nvPicPr>
+          <p:cNvPr id="6" name="Picture 5">
+            <a:extLst>
+              <a:ext uri="{FF2B5EF4-FFF2-40B4-BE49-F238E27FC236}">
+                <a16:creationId xmlns:a16="http://schemas.microsoft.com/office/drawing/2014/main" id="{9D85A6DA-9911-48D7-9456-9258D5E14BD3}"/>
+              </a:ext>
+            </a:extLst>
+          </p:cNvPr>
+          <p:cNvPicPr>
+            <a:picLocks noChangeAspect="1"/>
+          </p:cNvPicPr>
+          <p:nvPr/>
+        </p:nvPicPr>
+        <p:blipFill>
+          <a:blip r:embed="rId2"/>
+          <a:stretch>
+            <a:fillRect/>
+          </a:stretch>
+        </p:blipFill>
+        <p:spPr>
+          <a:xfrm>
+            <a:off x="4292477" y="434087"/>
+            <a:ext cx="7516274" cy="5496692"/>
+          </a:xfrm>
+          <a:prstGeom prst="rect">
+            <a:avLst/>
+          </a:prstGeom>
+        </p:spPr>
+      </p:pic>
+    </p:spTree>
+    <p:extLst>
+      <p:ext uri="{BB962C8B-B14F-4D97-AF65-F5344CB8AC3E}">
+        <p14:creationId xmlns:p14="http://schemas.microsoft.com/office/powerpoint/2010/main" val="689427509"/>
       </p:ext>
     </p:extLst>
   </p:cSld>

</xml_diff>

<commit_message>
updated docs and also moved app into appropriate structure for testability
</commit_message>
<xml_diff>
--- a/documentation/design/OiAIP & iPack ML Design Doc.pptx
+++ b/documentation/design/OiAIP & iPack ML Design Doc.pptx
@@ -10,6 +10,11 @@
     <p:sldId id="258" r:id="rId4"/>
     <p:sldId id="260" r:id="rId5"/>
     <p:sldId id="259" r:id="rId6"/>
+    <p:sldId id="261" r:id="rId7"/>
+    <p:sldId id="262" r:id="rId8"/>
+    <p:sldId id="264" r:id="rId9"/>
+    <p:sldId id="263" r:id="rId10"/>
+    <p:sldId id="265" r:id="rId11"/>
   </p:sldIdLst>
   <p:sldSz cx="12192000" cy="6858000"/>
   <p:notesSz cx="6858000" cy="9144000"/>
@@ -354,7 +359,7 @@
           <a:p>
             <a:fld id="{ED291B17-9318-49DB-B28B-6E5994AE9581}" type="datetime1">
               <a:rPr lang="en-US" smtClean="0"/>
-              <a:t>11/20/2019</a:t>
+              <a:t>11/25/2019</a:t>
             </a:fld>
             <a:endParaRPr lang="en-US" dirty="0"/>
           </a:p>
@@ -557,7 +562,7 @@
           <a:p>
             <a:fld id="{2CED4963-E985-44C4-B8C4-FDD613B7C2F8}" type="datetime1">
               <a:rPr lang="en-US" smtClean="0"/>
-              <a:t>11/20/2019</a:t>
+              <a:t>11/25/2019</a:t>
             </a:fld>
             <a:endParaRPr lang="en-US" dirty="0"/>
           </a:p>
@@ -919,7 +924,7 @@
           <a:p>
             <a:fld id="{ED291B17-9318-49DB-B28B-6E5994AE9581}" type="datetime1">
               <a:rPr lang="en-US" smtClean="0"/>
-              <a:t>11/20/2019</a:t>
+              <a:t>11/25/2019</a:t>
             </a:fld>
             <a:endParaRPr lang="en-US" dirty="0"/>
           </a:p>
@@ -1117,7 +1122,7 @@
           <a:p>
             <a:fld id="{78DD82B9-B8EE-4375-B6FF-88FA6ABB15D9}" type="datetime1">
               <a:rPr lang="en-US" smtClean="0"/>
-              <a:t>11/20/2019</a:t>
+              <a:t>11/25/2019</a:t>
             </a:fld>
             <a:endParaRPr lang="en-US" dirty="0"/>
           </a:p>
@@ -1429,7 +1434,7 @@
           <a:p>
             <a:fld id="{B2497495-0637-405E-AE64-5CC7506D51F5}" type="datetime1">
               <a:rPr lang="en-US" smtClean="0"/>
-              <a:t>11/20/2019</a:t>
+              <a:t>11/25/2019</a:t>
             </a:fld>
             <a:endParaRPr lang="en-US" dirty="0"/>
           </a:p>
@@ -1682,7 +1687,7 @@
           <a:p>
             <a:fld id="{7BFFD690-9426-415D-8B65-26881E07B2D4}" type="datetime1">
               <a:rPr lang="en-US" smtClean="0"/>
-              <a:t>11/20/2019</a:t>
+              <a:t>11/25/2019</a:t>
             </a:fld>
             <a:endParaRPr lang="en-US" dirty="0"/>
           </a:p>
@@ -2104,7 +2109,7 @@
           <a:p>
             <a:fld id="{04C4989A-474C-40DE-95B9-011C28B71673}" type="datetime1">
               <a:rPr lang="en-US" smtClean="0"/>
-              <a:t>11/20/2019</a:t>
+              <a:t>11/25/2019</a:t>
             </a:fld>
             <a:endParaRPr lang="en-US" dirty="0"/>
           </a:p>
@@ -2227,7 +2232,7 @@
           <a:p>
             <a:fld id="{5DB4ED54-5B5E-4A04-93D3-5772E3CE3818}" type="datetime1">
               <a:rPr lang="en-US" smtClean="0"/>
-              <a:t>11/20/2019</a:t>
+              <a:t>11/25/2019</a:t>
             </a:fld>
             <a:endParaRPr lang="en-US" dirty="0"/>
           </a:p>
@@ -2322,7 +2327,7 @@
           <a:p>
             <a:fld id="{4EDE50D6-574B-40AF-946F-D52A04ADE379}" type="datetime1">
               <a:rPr lang="en-US" smtClean="0"/>
-              <a:t>11/20/2019</a:t>
+              <a:t>11/25/2019</a:t>
             </a:fld>
             <a:endParaRPr lang="en-US" dirty="0"/>
           </a:p>
@@ -2699,7 +2704,7 @@
           <a:p>
             <a:fld id="{D82884F1-FFEA-405F-9602-3DCA865EDA4E}" type="datetime1">
               <a:rPr lang="en-US" smtClean="0"/>
-              <a:t>11/20/2019</a:t>
+              <a:t>11/25/2019</a:t>
             </a:fld>
             <a:endParaRPr lang="en-US" dirty="0"/>
           </a:p>
@@ -2992,7 +2997,7 @@
           <a:p>
             <a:fld id="{7E18DB4A-8810-4A10-AD5C-D5E2C667F5B3}" type="datetime1">
               <a:rPr lang="en-US" smtClean="0"/>
-              <a:t>11/20/2019</a:t>
+              <a:t>11/25/2019</a:t>
             </a:fld>
             <a:endParaRPr lang="en-US" dirty="0"/>
           </a:p>
@@ -3207,7 +3212,7 @@
           <a:p>
             <a:fld id="{ED291B17-9318-49DB-B28B-6E5994AE9581}" type="datetime1">
               <a:rPr lang="en-US" smtClean="0"/>
-              <a:t>11/20/2019</a:t>
+              <a:t>11/25/2019</a:t>
             </a:fld>
             <a:endParaRPr lang="en-US" dirty="0"/>
           </a:p>
@@ -4163,6 +4168,282 @@
 </p:sld>
 </file>
 
+<file path=ppt/slides/slide10.xml><?xml version="1.0" encoding="utf-8"?>
+<p:sld xmlns:a="http://schemas.openxmlformats.org/drawingml/2006/main" xmlns:r="http://schemas.openxmlformats.org/officeDocument/2006/relationships" xmlns:p="http://schemas.openxmlformats.org/presentationml/2006/main">
+  <p:cSld>
+    <p:spTree>
+      <p:nvGrpSpPr>
+        <p:cNvPr id="1" name=""/>
+        <p:cNvGrpSpPr/>
+        <p:nvPr/>
+      </p:nvGrpSpPr>
+      <p:grpSpPr>
+        <a:xfrm>
+          <a:off x="0" y="0"/>
+          <a:ext cx="0" cy="0"/>
+          <a:chOff x="0" y="0"/>
+          <a:chExt cx="0" cy="0"/>
+        </a:xfrm>
+      </p:grpSpPr>
+      <p:sp>
+        <p:nvSpPr>
+          <p:cNvPr id="2" name="Title 1">
+            <a:extLst>
+              <a:ext uri="{FF2B5EF4-FFF2-40B4-BE49-F238E27FC236}">
+                <a16:creationId xmlns:a16="http://schemas.microsoft.com/office/drawing/2014/main" id="{26E4BCBA-FF18-4234-9738-D4533BAE25A7}"/>
+              </a:ext>
+            </a:extLst>
+          </p:cNvPr>
+          <p:cNvSpPr>
+            <a:spLocks noGrp="1"/>
+          </p:cNvSpPr>
+          <p:nvPr>
+            <p:ph type="title"/>
+          </p:nvPr>
+        </p:nvSpPr>
+        <p:spPr>
+          <a:xfrm>
+            <a:off x="581192" y="702156"/>
+            <a:ext cx="11029616" cy="556193"/>
+          </a:xfrm>
+        </p:spPr>
+        <p:txBody>
+          <a:bodyPr>
+            <a:normAutofit fontScale="90000"/>
+          </a:bodyPr>
+          <a:lstStyle/>
+          <a:p>
+            <a:r>
+              <a:rPr lang="en-US" dirty="0"/>
+              <a:t>API Definitions &amp; Data</a:t>
+            </a:r>
+          </a:p>
+        </p:txBody>
+      </p:sp>
+      <p:sp>
+        <p:nvSpPr>
+          <p:cNvPr id="3" name="Content Placeholder 2">
+            <a:extLst>
+              <a:ext uri="{FF2B5EF4-FFF2-40B4-BE49-F238E27FC236}">
+                <a16:creationId xmlns:a16="http://schemas.microsoft.com/office/drawing/2014/main" id="{8D82351E-DB24-42C8-9BF2-D1DB8E8DE470}"/>
+              </a:ext>
+            </a:extLst>
+          </p:cNvPr>
+          <p:cNvSpPr>
+            <a:spLocks noGrp="1"/>
+          </p:cNvSpPr>
+          <p:nvPr>
+            <p:ph idx="1"/>
+          </p:nvPr>
+        </p:nvSpPr>
+        <p:spPr>
+          <a:xfrm>
+            <a:off x="581192" y="1264807"/>
+            <a:ext cx="11029615" cy="5161159"/>
+          </a:xfrm>
+        </p:spPr>
+        <p:txBody>
+          <a:bodyPr>
+            <a:normAutofit/>
+          </a:bodyPr>
+          <a:lstStyle/>
+          <a:p>
+            <a:pPr marL="285750" indent="-285750">
+              <a:buFont typeface="Arial" panose="020B0604020202020204" pitchFamily="34" charset="0"/>
+              <a:buChar char="•"/>
+            </a:pPr>
+            <a:r>
+              <a:rPr lang="en-US" sz="2000" dirty="0"/>
+              <a:t>Train Specific Model for </a:t>
+            </a:r>
+            <a:r>
+              <a:rPr lang="en-US" sz="2000" dirty="0" err="1"/>
+              <a:t>iPack</a:t>
+            </a:r>
+            <a:endParaRPr lang="en-US" sz="2000" dirty="0"/>
+          </a:p>
+          <a:p>
+            <a:pPr lvl="1"/>
+            <a:r>
+              <a:rPr lang="en-US" sz="1800" dirty="0"/>
+              <a:t>POST: </a:t>
+            </a:r>
+            <a:r>
+              <a:rPr lang="en-US" sz="1800" dirty="0">
+                <a:hlinkClick r:id="rId2"/>
+              </a:rPr>
+              <a:t>https://hosturl/api/v1/ml/models/metrics/</a:t>
+            </a:r>
+            <a:r>
+              <a:rPr lang="en-US" sz="1800" dirty="0"/>
+              <a:t> - body = application/json</a:t>
+            </a:r>
+          </a:p>
+          <a:p>
+            <a:pPr lvl="1"/>
+            <a:r>
+              <a:rPr lang="en-US" sz="1800" dirty="0"/>
+              <a:t>Properties</a:t>
+            </a:r>
+          </a:p>
+          <a:p>
+            <a:pPr lvl="2"/>
+            <a:r>
+              <a:rPr lang="en-US" sz="1600" dirty="0"/>
+              <a:t>“</a:t>
+            </a:r>
+            <a:r>
+              <a:rPr lang="en-US" sz="1600" dirty="0" err="1"/>
+              <a:t>PackId</a:t>
+            </a:r>
+            <a:r>
+              <a:rPr lang="en-US" sz="1600" dirty="0"/>
+              <a:t>” - String</a:t>
+            </a:r>
+          </a:p>
+          <a:p>
+            <a:pPr lvl="2"/>
+            <a:r>
+              <a:rPr lang="en-US" sz="1600" dirty="0"/>
+              <a:t>“</a:t>
+            </a:r>
+            <a:r>
+              <a:rPr lang="en-US" sz="1600" dirty="0" err="1"/>
+              <a:t>ProjectAlias</a:t>
+            </a:r>
+            <a:r>
+              <a:rPr lang="en-US" sz="1600" dirty="0"/>
+              <a:t>” – String</a:t>
+            </a:r>
+          </a:p>
+          <a:p>
+            <a:pPr lvl="2"/>
+            <a:r>
+              <a:rPr lang="en-US" sz="1600" dirty="0"/>
+              <a:t>“</a:t>
+            </a:r>
+            <a:r>
+              <a:rPr lang="en-US" sz="1600" dirty="0" err="1"/>
+              <a:t>ModelDefinitionName</a:t>
+            </a:r>
+            <a:r>
+              <a:rPr lang="en-US" sz="1600" dirty="0"/>
+              <a:t>” – String</a:t>
+            </a:r>
+          </a:p>
+          <a:p>
+            <a:pPr lvl="2"/>
+            <a:r>
+              <a:rPr lang="en-US" sz="1600" dirty="0"/>
+              <a:t>OPTIONAL:</a:t>
+            </a:r>
+          </a:p>
+          <a:p>
+            <a:pPr lvl="3"/>
+            <a:r>
+              <a:rPr lang="en-US" sz="1400" dirty="0"/>
+              <a:t>“limit” – Int (limits number returned to this value; grabbing just the latest)  If not provided, returns ALL</a:t>
+            </a:r>
+          </a:p>
+          <a:p>
+            <a:pPr lvl="1"/>
+            <a:r>
+              <a:rPr lang="en-US" sz="2000" dirty="0"/>
+              <a:t>What it does:</a:t>
+            </a:r>
+          </a:p>
+          <a:p>
+            <a:pPr lvl="2"/>
+            <a:r>
+              <a:rPr lang="en-US" sz="1600" dirty="0"/>
+              <a:t>For each run of the specified model, retrieves:</a:t>
+            </a:r>
+          </a:p>
+          <a:p>
+            <a:pPr lvl="3"/>
+            <a:r>
+              <a:rPr lang="en-US" sz="1200" dirty="0"/>
+              <a:t>“</a:t>
+            </a:r>
+            <a:r>
+              <a:rPr lang="en-US" sz="1200" dirty="0" err="1"/>
+              <a:t>PackId</a:t>
+            </a:r>
+            <a:r>
+              <a:rPr lang="en-US" sz="1200" dirty="0"/>
+              <a:t>”, “</a:t>
+            </a:r>
+            <a:r>
+              <a:rPr lang="en-US" sz="1200" dirty="0" err="1"/>
+              <a:t>ProjectAlias</a:t>
+            </a:r>
+            <a:r>
+              <a:rPr lang="en-US" sz="1200" dirty="0"/>
+              <a:t>”, “</a:t>
+            </a:r>
+            <a:r>
+              <a:rPr lang="en-US" sz="1200" dirty="0" err="1"/>
+              <a:t>ModelDefinitionName</a:t>
+            </a:r>
+            <a:r>
+              <a:rPr lang="en-US" sz="1200" dirty="0"/>
+              <a:t>”, “</a:t>
+            </a:r>
+            <a:r>
+              <a:rPr lang="en-US" sz="1200" dirty="0" err="1"/>
+              <a:t>RunIteration</a:t>
+            </a:r>
+            <a:r>
+              <a:rPr lang="en-US" sz="1200" dirty="0"/>
+              <a:t>#”, “</a:t>
+            </a:r>
+            <a:r>
+              <a:rPr lang="en-US" sz="1200" dirty="0" err="1"/>
+              <a:t>RunStartTimeUTC</a:t>
+            </a:r>
+            <a:r>
+              <a:rPr lang="en-US" sz="1200" dirty="0"/>
+              <a:t>”, “</a:t>
+            </a:r>
+            <a:r>
+              <a:rPr lang="en-US" sz="1200" dirty="0" err="1"/>
+              <a:t>RunEndTimeUTC</a:t>
+            </a:r>
+            <a:r>
+              <a:rPr lang="en-US" sz="1200" dirty="0"/>
+              <a:t>”, “</a:t>
+            </a:r>
+            <a:r>
+              <a:rPr lang="en-US" sz="1200" dirty="0" err="1"/>
+              <a:t>RunStatus</a:t>
+            </a:r>
+            <a:r>
+              <a:rPr lang="en-US" sz="1200" dirty="0"/>
+              <a:t>”, “Metrics”</a:t>
+            </a:r>
+          </a:p>
+          <a:p>
+            <a:pPr lvl="3"/>
+            <a:r>
+              <a:rPr lang="en-US" sz="1200" dirty="0"/>
+              <a:t>Metrics: Dictionary Key Value, key is the parameter name and value is the value of that key/metric.</a:t>
+            </a:r>
+          </a:p>
+        </p:txBody>
+      </p:sp>
+    </p:spTree>
+    <p:extLst>
+      <p:ext uri="{BB962C8B-B14F-4D97-AF65-F5344CB8AC3E}">
+        <p14:creationId xmlns:p14="http://schemas.microsoft.com/office/powerpoint/2010/main" val="589214710"/>
+      </p:ext>
+    </p:extLst>
+  </p:cSld>
+  <p:clrMapOvr>
+    <a:masterClrMapping/>
+  </p:clrMapOvr>
+</p:sld>
+</file>
+
 <file path=ppt/slides/slide2.xml><?xml version="1.0" encoding="utf-8"?>
 <p:sld xmlns:a="http://schemas.openxmlformats.org/drawingml/2006/main" xmlns:r="http://schemas.openxmlformats.org/officeDocument/2006/relationships" xmlns:p="http://schemas.openxmlformats.org/presentationml/2006/main">
   <p:cSld>
@@ -6162,6 +6443,949 @@
     <p:extLst>
       <p:ext uri="{BB962C8B-B14F-4D97-AF65-F5344CB8AC3E}">
         <p14:creationId xmlns:p14="http://schemas.microsoft.com/office/powerpoint/2010/main" val="689427509"/>
+      </p:ext>
+    </p:extLst>
+  </p:cSld>
+  <p:clrMapOvr>
+    <a:masterClrMapping/>
+  </p:clrMapOvr>
+</p:sld>
+</file>
+
+<file path=ppt/slides/slide6.xml><?xml version="1.0" encoding="utf-8"?>
+<p:sld xmlns:a="http://schemas.openxmlformats.org/drawingml/2006/main" xmlns:r="http://schemas.openxmlformats.org/officeDocument/2006/relationships" xmlns:p="http://schemas.openxmlformats.org/presentationml/2006/main">
+  <p:cSld>
+    <p:spTree>
+      <p:nvGrpSpPr>
+        <p:cNvPr id="1" name=""/>
+        <p:cNvGrpSpPr/>
+        <p:nvPr/>
+      </p:nvGrpSpPr>
+      <p:grpSpPr>
+        <a:xfrm>
+          <a:off x="0" y="0"/>
+          <a:ext cx="0" cy="0"/>
+          <a:chOff x="0" y="0"/>
+          <a:chExt cx="0" cy="0"/>
+        </a:xfrm>
+      </p:grpSpPr>
+      <p:sp>
+        <p:nvSpPr>
+          <p:cNvPr id="2" name="Title 1">
+            <a:extLst>
+              <a:ext uri="{FF2B5EF4-FFF2-40B4-BE49-F238E27FC236}">
+                <a16:creationId xmlns:a16="http://schemas.microsoft.com/office/drawing/2014/main" id="{26E4BCBA-FF18-4234-9738-D4533BAE25A7}"/>
+              </a:ext>
+            </a:extLst>
+          </p:cNvPr>
+          <p:cNvSpPr>
+            <a:spLocks noGrp="1"/>
+          </p:cNvSpPr>
+          <p:nvPr>
+            <p:ph type="title"/>
+          </p:nvPr>
+        </p:nvSpPr>
+        <p:spPr>
+          <a:xfrm>
+            <a:off x="581192" y="702156"/>
+            <a:ext cx="11029616" cy="556193"/>
+          </a:xfrm>
+        </p:spPr>
+        <p:txBody>
+          <a:bodyPr>
+            <a:normAutofit fontScale="90000"/>
+          </a:bodyPr>
+          <a:lstStyle/>
+          <a:p>
+            <a:r>
+              <a:rPr lang="en-US" dirty="0"/>
+              <a:t>API Definitions &amp; Data</a:t>
+            </a:r>
+          </a:p>
+        </p:txBody>
+      </p:sp>
+      <p:sp>
+        <p:nvSpPr>
+          <p:cNvPr id="3" name="Content Placeholder 2">
+            <a:extLst>
+              <a:ext uri="{FF2B5EF4-FFF2-40B4-BE49-F238E27FC236}">
+                <a16:creationId xmlns:a16="http://schemas.microsoft.com/office/drawing/2014/main" id="{8D82351E-DB24-42C8-9BF2-D1DB8E8DE470}"/>
+              </a:ext>
+            </a:extLst>
+          </p:cNvPr>
+          <p:cNvSpPr>
+            <a:spLocks noGrp="1"/>
+          </p:cNvSpPr>
+          <p:nvPr>
+            <p:ph idx="1"/>
+          </p:nvPr>
+        </p:nvSpPr>
+        <p:spPr>
+          <a:xfrm>
+            <a:off x="581192" y="1264807"/>
+            <a:ext cx="11029615" cy="5161159"/>
+          </a:xfrm>
+        </p:spPr>
+        <p:txBody>
+          <a:bodyPr>
+            <a:normAutofit fontScale="92500" lnSpcReduction="10000"/>
+          </a:bodyPr>
+          <a:lstStyle/>
+          <a:p>
+            <a:r>
+              <a:rPr lang="en-US" sz="2000" dirty="0"/>
+              <a:t>Capture New Data for </a:t>
+            </a:r>
+            <a:r>
+              <a:rPr lang="en-US" sz="2000" dirty="0" err="1"/>
+              <a:t>iPack</a:t>
+            </a:r>
+            <a:r>
+              <a:rPr lang="en-US" sz="2000" dirty="0"/>
+              <a:t>: </a:t>
+            </a:r>
+          </a:p>
+          <a:p>
+            <a:pPr lvl="1"/>
+            <a:r>
+              <a:rPr lang="en-US" sz="1800" dirty="0"/>
+              <a:t>POST: </a:t>
+            </a:r>
+            <a:r>
+              <a:rPr lang="en-US" sz="1800" dirty="0">
+                <a:hlinkClick r:id="rId2"/>
+              </a:rPr>
+              <a:t>https://hosturl/api/v1/data/capture/</a:t>
+            </a:r>
+            <a:r>
+              <a:rPr lang="en-US" sz="1800" dirty="0"/>
+              <a:t> - body = application/json</a:t>
+            </a:r>
+          </a:p>
+          <a:p>
+            <a:pPr lvl="1"/>
+            <a:r>
+              <a:rPr lang="en-US" sz="1800" dirty="0"/>
+              <a:t>Properties</a:t>
+            </a:r>
+          </a:p>
+          <a:p>
+            <a:pPr lvl="2"/>
+            <a:r>
+              <a:rPr lang="en-US" sz="1600" dirty="0"/>
+              <a:t>“</a:t>
+            </a:r>
+            <a:r>
+              <a:rPr lang="en-US" sz="1600" dirty="0" err="1"/>
+              <a:t>PackId</a:t>
+            </a:r>
+            <a:r>
+              <a:rPr lang="en-US" sz="1600" dirty="0"/>
+              <a:t>” - String</a:t>
+            </a:r>
+          </a:p>
+          <a:p>
+            <a:pPr lvl="2"/>
+            <a:r>
+              <a:rPr lang="en-US" sz="1600" dirty="0"/>
+              <a:t>“</a:t>
+            </a:r>
+            <a:r>
+              <a:rPr lang="en-US" sz="1600" dirty="0" err="1"/>
+              <a:t>ProjectAlias</a:t>
+            </a:r>
+            <a:r>
+              <a:rPr lang="en-US" sz="1600" dirty="0"/>
+              <a:t>” - String</a:t>
+            </a:r>
+          </a:p>
+          <a:p>
+            <a:pPr lvl="2"/>
+            <a:r>
+              <a:rPr lang="en-US" sz="1600" dirty="0"/>
+              <a:t>“</a:t>
+            </a:r>
+            <a:r>
+              <a:rPr lang="en-US" sz="1600" dirty="0" err="1"/>
+              <a:t>StartCollectTime</a:t>
+            </a:r>
+            <a:r>
+              <a:rPr lang="en-US" sz="1600" dirty="0"/>
+              <a:t>” – </a:t>
+            </a:r>
+            <a:r>
+              <a:rPr lang="en-US" sz="1600" dirty="0" err="1"/>
+              <a:t>DateTime</a:t>
+            </a:r>
+            <a:r>
+              <a:rPr lang="en-US" sz="1600" dirty="0"/>
+              <a:t> as UTC</a:t>
+            </a:r>
+          </a:p>
+          <a:p>
+            <a:pPr lvl="2"/>
+            <a:r>
+              <a:rPr lang="en-US" sz="1600" dirty="0"/>
+              <a:t>“</a:t>
+            </a:r>
+            <a:r>
+              <a:rPr lang="en-US" sz="1600" dirty="0" err="1"/>
+              <a:t>CollectDuration</a:t>
+            </a:r>
+            <a:r>
+              <a:rPr lang="en-US" sz="1600" dirty="0"/>
+              <a:t>” - </a:t>
+            </a:r>
+            <a:r>
+              <a:rPr lang="en-US" sz="1600" dirty="0" err="1"/>
+              <a:t>TimeDelta</a:t>
+            </a:r>
+            <a:endParaRPr lang="en-US" sz="1600" dirty="0"/>
+          </a:p>
+          <a:p>
+            <a:pPr lvl="2"/>
+            <a:r>
+              <a:rPr lang="en-US" sz="1600" dirty="0"/>
+              <a:t>OPTIONAL: </a:t>
+            </a:r>
+          </a:p>
+          <a:p>
+            <a:pPr lvl="3"/>
+            <a:r>
+              <a:rPr lang="en-US" sz="1400" dirty="0"/>
+              <a:t>“Tags” – List&lt;String&gt;</a:t>
+            </a:r>
+          </a:p>
+          <a:p>
+            <a:pPr lvl="3"/>
+            <a:r>
+              <a:rPr lang="en-US" sz="1400" dirty="0"/>
+              <a:t>“</a:t>
+            </a:r>
+            <a:r>
+              <a:rPr lang="en-US" sz="1400" dirty="0" err="1"/>
+              <a:t>TimeOut</a:t>
+            </a:r>
+            <a:r>
+              <a:rPr lang="en-US" sz="1400" dirty="0"/>
+              <a:t>” – </a:t>
+            </a:r>
+            <a:r>
+              <a:rPr lang="en-US" sz="1400" dirty="0" err="1"/>
+              <a:t>TimeDelta</a:t>
+            </a:r>
+            <a:r>
+              <a:rPr lang="en-US" sz="1400" dirty="0"/>
+              <a:t> (Default 12 hours)</a:t>
+            </a:r>
+          </a:p>
+          <a:p>
+            <a:pPr lvl="1"/>
+            <a:r>
+              <a:rPr lang="en-US" sz="2000" dirty="0"/>
+              <a:t>What it does:</a:t>
+            </a:r>
+          </a:p>
+          <a:p>
+            <a:pPr lvl="2"/>
+            <a:r>
+              <a:rPr lang="en-US" sz="1600" dirty="0"/>
+              <a:t>Put Message on Azure Queue</a:t>
+            </a:r>
+          </a:p>
+          <a:p>
+            <a:pPr lvl="3"/>
+            <a:r>
+              <a:rPr lang="en-US" sz="1400" dirty="0"/>
+              <a:t>If IOT: Send Cloud to Device Message</a:t>
+            </a:r>
+          </a:p>
+          <a:p>
+            <a:pPr lvl="3"/>
+            <a:r>
+              <a:rPr lang="en-US" sz="1400" dirty="0"/>
+              <a:t>If Cloud:</a:t>
+            </a:r>
+          </a:p>
+          <a:p>
+            <a:pPr lvl="3"/>
+            <a:r>
+              <a:rPr lang="en-US" sz="1400" dirty="0"/>
+              <a:t>Open Question: Who dequeues the message? The Device Capture Module(s) or the cloud service?  How is this done?</a:t>
+            </a:r>
+          </a:p>
+        </p:txBody>
+      </p:sp>
+    </p:spTree>
+    <p:extLst>
+      <p:ext uri="{BB962C8B-B14F-4D97-AF65-F5344CB8AC3E}">
+        <p14:creationId xmlns:p14="http://schemas.microsoft.com/office/powerpoint/2010/main" val="3577682112"/>
+      </p:ext>
+    </p:extLst>
+  </p:cSld>
+  <p:clrMapOvr>
+    <a:masterClrMapping/>
+  </p:clrMapOvr>
+</p:sld>
+</file>
+
+<file path=ppt/slides/slide7.xml><?xml version="1.0" encoding="utf-8"?>
+<p:sld xmlns:a="http://schemas.openxmlformats.org/drawingml/2006/main" xmlns:r="http://schemas.openxmlformats.org/officeDocument/2006/relationships" xmlns:p="http://schemas.openxmlformats.org/presentationml/2006/main">
+  <p:cSld>
+    <p:spTree>
+      <p:nvGrpSpPr>
+        <p:cNvPr id="1" name=""/>
+        <p:cNvGrpSpPr/>
+        <p:nvPr/>
+      </p:nvGrpSpPr>
+      <p:grpSpPr>
+        <a:xfrm>
+          <a:off x="0" y="0"/>
+          <a:ext cx="0" cy="0"/>
+          <a:chOff x="0" y="0"/>
+          <a:chExt cx="0" cy="0"/>
+        </a:xfrm>
+      </p:grpSpPr>
+      <p:sp>
+        <p:nvSpPr>
+          <p:cNvPr id="2" name="Title 1">
+            <a:extLst>
+              <a:ext uri="{FF2B5EF4-FFF2-40B4-BE49-F238E27FC236}">
+                <a16:creationId xmlns:a16="http://schemas.microsoft.com/office/drawing/2014/main" id="{26E4BCBA-FF18-4234-9738-D4533BAE25A7}"/>
+              </a:ext>
+            </a:extLst>
+          </p:cNvPr>
+          <p:cNvSpPr>
+            <a:spLocks noGrp="1"/>
+          </p:cNvSpPr>
+          <p:nvPr>
+            <p:ph type="title"/>
+          </p:nvPr>
+        </p:nvSpPr>
+        <p:spPr>
+          <a:xfrm>
+            <a:off x="581192" y="702156"/>
+            <a:ext cx="11029616" cy="556193"/>
+          </a:xfrm>
+        </p:spPr>
+        <p:txBody>
+          <a:bodyPr>
+            <a:normAutofit fontScale="90000"/>
+          </a:bodyPr>
+          <a:lstStyle/>
+          <a:p>
+            <a:r>
+              <a:rPr lang="en-US" dirty="0"/>
+              <a:t>API Definitions &amp; Data</a:t>
+            </a:r>
+          </a:p>
+        </p:txBody>
+      </p:sp>
+      <p:sp>
+        <p:nvSpPr>
+          <p:cNvPr id="3" name="Content Placeholder 2">
+            <a:extLst>
+              <a:ext uri="{FF2B5EF4-FFF2-40B4-BE49-F238E27FC236}">
+                <a16:creationId xmlns:a16="http://schemas.microsoft.com/office/drawing/2014/main" id="{8D82351E-DB24-42C8-9BF2-D1DB8E8DE470}"/>
+              </a:ext>
+            </a:extLst>
+          </p:cNvPr>
+          <p:cNvSpPr>
+            <a:spLocks noGrp="1"/>
+          </p:cNvSpPr>
+          <p:nvPr>
+            <p:ph idx="1"/>
+          </p:nvPr>
+        </p:nvSpPr>
+        <p:spPr>
+          <a:xfrm>
+            <a:off x="581192" y="1264807"/>
+            <a:ext cx="11029615" cy="5161159"/>
+          </a:xfrm>
+        </p:spPr>
+        <p:txBody>
+          <a:bodyPr>
+            <a:normAutofit/>
+          </a:bodyPr>
+          <a:lstStyle/>
+          <a:p>
+            <a:pPr marL="285750" indent="-285750">
+              <a:buFont typeface="Arial" panose="020B0604020202020204" pitchFamily="34" charset="0"/>
+              <a:buChar char="•"/>
+            </a:pPr>
+            <a:r>
+              <a:rPr lang="en-US" sz="2000" dirty="0"/>
+              <a:t>Get # Currently Staged Captured data for </a:t>
+            </a:r>
+            <a:r>
+              <a:rPr lang="en-US" sz="2000" dirty="0" err="1"/>
+              <a:t>iPack</a:t>
+            </a:r>
+            <a:r>
+              <a:rPr lang="en-US" sz="2000" dirty="0"/>
+              <a:t>:</a:t>
+            </a:r>
+          </a:p>
+          <a:p>
+            <a:pPr lvl="1"/>
+            <a:r>
+              <a:rPr lang="en-US" sz="1800" dirty="0"/>
+              <a:t>POST: </a:t>
+            </a:r>
+            <a:r>
+              <a:rPr lang="en-US" sz="1800" dirty="0">
+                <a:hlinkClick r:id="rId2"/>
+              </a:rPr>
+              <a:t>https://hosturl/api/v1/data/captureddata/staged/</a:t>
+            </a:r>
+            <a:r>
+              <a:rPr lang="en-US" sz="1800" dirty="0"/>
+              <a:t> - body = application/json</a:t>
+            </a:r>
+          </a:p>
+          <a:p>
+            <a:pPr lvl="1"/>
+            <a:r>
+              <a:rPr lang="en-US" sz="1800" dirty="0"/>
+              <a:t>Properties</a:t>
+            </a:r>
+          </a:p>
+          <a:p>
+            <a:pPr lvl="2"/>
+            <a:r>
+              <a:rPr lang="en-US" sz="1600" dirty="0"/>
+              <a:t>“</a:t>
+            </a:r>
+            <a:r>
+              <a:rPr lang="en-US" sz="1600" dirty="0" err="1"/>
+              <a:t>PackId</a:t>
+            </a:r>
+            <a:r>
+              <a:rPr lang="en-US" sz="1600" dirty="0"/>
+              <a:t>” - String</a:t>
+            </a:r>
+          </a:p>
+          <a:p>
+            <a:pPr lvl="2"/>
+            <a:r>
+              <a:rPr lang="en-US" sz="1600" dirty="0"/>
+              <a:t>“</a:t>
+            </a:r>
+            <a:r>
+              <a:rPr lang="en-US" sz="1600" dirty="0" err="1"/>
+              <a:t>ProjectAlias</a:t>
+            </a:r>
+            <a:r>
+              <a:rPr lang="en-US" sz="1600" dirty="0"/>
+              <a:t>” - String</a:t>
+            </a:r>
+          </a:p>
+          <a:p>
+            <a:pPr lvl="1"/>
+            <a:r>
+              <a:rPr lang="en-US" sz="2000" dirty="0"/>
+              <a:t>What it does:</a:t>
+            </a:r>
+          </a:p>
+          <a:p>
+            <a:pPr lvl="2"/>
+            <a:r>
+              <a:rPr lang="en-US" sz="1600" dirty="0"/>
+              <a:t>Retrieves the quantity of data currently staged (collected, but not transferred) in the </a:t>
+            </a:r>
+            <a:r>
+              <a:rPr lang="en-US" sz="1600" dirty="0" err="1"/>
+              <a:t>iPack’s</a:t>
+            </a:r>
+            <a:r>
+              <a:rPr lang="en-US" sz="1600" dirty="0"/>
+              <a:t> staging blob waiting to be transferred to the labelling tool’s storage location.</a:t>
+            </a:r>
+          </a:p>
+          <a:p>
+            <a:pPr lvl="2"/>
+            <a:r>
+              <a:rPr lang="en-US" sz="1600" dirty="0"/>
+              <a:t>This is counted as a discrete number of blobs in the blob storage.</a:t>
+            </a:r>
+            <a:endParaRPr lang="en-US" sz="1400" dirty="0"/>
+          </a:p>
+        </p:txBody>
+      </p:sp>
+    </p:spTree>
+    <p:extLst>
+      <p:ext uri="{BB962C8B-B14F-4D97-AF65-F5344CB8AC3E}">
+        <p14:creationId xmlns:p14="http://schemas.microsoft.com/office/powerpoint/2010/main" val="1145991879"/>
+      </p:ext>
+    </p:extLst>
+  </p:cSld>
+  <p:clrMapOvr>
+    <a:masterClrMapping/>
+  </p:clrMapOvr>
+</p:sld>
+</file>
+
+<file path=ppt/slides/slide8.xml><?xml version="1.0" encoding="utf-8"?>
+<p:sld xmlns:a="http://schemas.openxmlformats.org/drawingml/2006/main" xmlns:r="http://schemas.openxmlformats.org/officeDocument/2006/relationships" xmlns:p="http://schemas.openxmlformats.org/presentationml/2006/main">
+  <p:cSld>
+    <p:spTree>
+      <p:nvGrpSpPr>
+        <p:cNvPr id="1" name=""/>
+        <p:cNvGrpSpPr/>
+        <p:nvPr/>
+      </p:nvGrpSpPr>
+      <p:grpSpPr>
+        <a:xfrm>
+          <a:off x="0" y="0"/>
+          <a:ext cx="0" cy="0"/>
+          <a:chOff x="0" y="0"/>
+          <a:chExt cx="0" cy="0"/>
+        </a:xfrm>
+      </p:grpSpPr>
+      <p:sp>
+        <p:nvSpPr>
+          <p:cNvPr id="2" name="Title 1">
+            <a:extLst>
+              <a:ext uri="{FF2B5EF4-FFF2-40B4-BE49-F238E27FC236}">
+                <a16:creationId xmlns:a16="http://schemas.microsoft.com/office/drawing/2014/main" id="{26E4BCBA-FF18-4234-9738-D4533BAE25A7}"/>
+              </a:ext>
+            </a:extLst>
+          </p:cNvPr>
+          <p:cNvSpPr>
+            <a:spLocks noGrp="1"/>
+          </p:cNvSpPr>
+          <p:nvPr>
+            <p:ph type="title"/>
+          </p:nvPr>
+        </p:nvSpPr>
+        <p:spPr>
+          <a:xfrm>
+            <a:off x="581192" y="702156"/>
+            <a:ext cx="11029616" cy="556193"/>
+          </a:xfrm>
+        </p:spPr>
+        <p:txBody>
+          <a:bodyPr>
+            <a:normAutofit fontScale="90000"/>
+          </a:bodyPr>
+          <a:lstStyle/>
+          <a:p>
+            <a:r>
+              <a:rPr lang="en-US" dirty="0"/>
+              <a:t>API Definitions &amp; Data</a:t>
+            </a:r>
+          </a:p>
+        </p:txBody>
+      </p:sp>
+      <p:sp>
+        <p:nvSpPr>
+          <p:cNvPr id="3" name="Content Placeholder 2">
+            <a:extLst>
+              <a:ext uri="{FF2B5EF4-FFF2-40B4-BE49-F238E27FC236}">
+                <a16:creationId xmlns:a16="http://schemas.microsoft.com/office/drawing/2014/main" id="{8D82351E-DB24-42C8-9BF2-D1DB8E8DE470}"/>
+              </a:ext>
+            </a:extLst>
+          </p:cNvPr>
+          <p:cNvSpPr>
+            <a:spLocks noGrp="1"/>
+          </p:cNvSpPr>
+          <p:nvPr>
+            <p:ph idx="1"/>
+          </p:nvPr>
+        </p:nvSpPr>
+        <p:spPr>
+          <a:xfrm>
+            <a:off x="581192" y="1264807"/>
+            <a:ext cx="11029615" cy="5161159"/>
+          </a:xfrm>
+        </p:spPr>
+        <p:txBody>
+          <a:bodyPr>
+            <a:normAutofit/>
+          </a:bodyPr>
+          <a:lstStyle/>
+          <a:p>
+            <a:pPr marL="285750" indent="-285750">
+              <a:buFont typeface="Arial" panose="020B0604020202020204" pitchFamily="34" charset="0"/>
+              <a:buChar char="•"/>
+            </a:pPr>
+            <a:r>
+              <a:rPr lang="en-US" sz="2000" dirty="0"/>
+              <a:t>Get Model Parameters &amp; Default Values</a:t>
+            </a:r>
+          </a:p>
+          <a:p>
+            <a:pPr lvl="1"/>
+            <a:r>
+              <a:rPr lang="en-US" sz="1800" dirty="0"/>
+              <a:t>POST: </a:t>
+            </a:r>
+            <a:r>
+              <a:rPr lang="en-US" sz="1800" dirty="0">
+                <a:hlinkClick r:id="rId2"/>
+              </a:rPr>
+              <a:t>https://hosturl/api/v1/ml/models/params/</a:t>
+            </a:r>
+            <a:r>
+              <a:rPr lang="en-US" sz="1800" dirty="0"/>
+              <a:t> - body = application/json</a:t>
+            </a:r>
+          </a:p>
+          <a:p>
+            <a:pPr lvl="1"/>
+            <a:r>
+              <a:rPr lang="en-US" sz="1800" dirty="0"/>
+              <a:t>Properties</a:t>
+            </a:r>
+          </a:p>
+          <a:p>
+            <a:pPr lvl="2"/>
+            <a:r>
+              <a:rPr lang="en-US" sz="1600" dirty="0"/>
+              <a:t>“</a:t>
+            </a:r>
+            <a:r>
+              <a:rPr lang="en-US" sz="1600" dirty="0" err="1"/>
+              <a:t>PackId</a:t>
+            </a:r>
+            <a:r>
+              <a:rPr lang="en-US" sz="1600" dirty="0"/>
+              <a:t>” - String</a:t>
+            </a:r>
+          </a:p>
+          <a:p>
+            <a:pPr lvl="2"/>
+            <a:r>
+              <a:rPr lang="en-US" sz="1600" dirty="0"/>
+              <a:t>“</a:t>
+            </a:r>
+            <a:r>
+              <a:rPr lang="en-US" sz="1600" dirty="0" err="1"/>
+              <a:t>ProjectAlias</a:t>
+            </a:r>
+            <a:r>
+              <a:rPr lang="en-US" sz="1600" dirty="0"/>
+              <a:t>” – String</a:t>
+            </a:r>
+          </a:p>
+          <a:p>
+            <a:pPr lvl="2"/>
+            <a:r>
+              <a:rPr lang="en-US" sz="1600" dirty="0"/>
+              <a:t>“</a:t>
+            </a:r>
+            <a:r>
+              <a:rPr lang="en-US" sz="1600" dirty="0" err="1"/>
+              <a:t>ModelDefinitionName</a:t>
+            </a:r>
+            <a:r>
+              <a:rPr lang="en-US" sz="1600" dirty="0"/>
+              <a:t>” – String</a:t>
+            </a:r>
+          </a:p>
+          <a:p>
+            <a:pPr lvl="1"/>
+            <a:r>
+              <a:rPr lang="en-US" sz="2000" dirty="0"/>
+              <a:t>What it does:</a:t>
+            </a:r>
+          </a:p>
+          <a:p>
+            <a:pPr lvl="2"/>
+            <a:r>
+              <a:rPr lang="en-US" sz="1600" dirty="0"/>
+              <a:t>Returns a JSON with following values</a:t>
+            </a:r>
+          </a:p>
+          <a:p>
+            <a:pPr lvl="3"/>
+            <a:r>
+              <a:rPr lang="en-US" sz="1400" dirty="0"/>
+              <a:t>“</a:t>
+            </a:r>
+            <a:r>
+              <a:rPr lang="en-US" sz="1400" dirty="0" err="1"/>
+              <a:t>PackId</a:t>
+            </a:r>
+            <a:r>
+              <a:rPr lang="en-US" sz="1400" dirty="0"/>
+              <a:t>”,”</a:t>
+            </a:r>
+            <a:r>
+              <a:rPr lang="en-US" sz="1400" dirty="0" err="1"/>
+              <a:t>ProjectAlias</a:t>
+            </a:r>
+            <a:r>
+              <a:rPr lang="en-US" sz="1400" dirty="0"/>
+              <a:t>”,”</a:t>
+            </a:r>
+            <a:r>
+              <a:rPr lang="en-US" sz="1400" dirty="0" err="1"/>
+              <a:t>ModelDefinitionName</a:t>
+            </a:r>
+            <a:r>
+              <a:rPr lang="en-US" sz="1400" dirty="0"/>
+              <a:t>”,”Params”</a:t>
+            </a:r>
+          </a:p>
+          <a:p>
+            <a:pPr lvl="3"/>
+            <a:r>
+              <a:rPr lang="en-US" sz="1400" dirty="0"/>
+              <a:t>“Params” : Dictionary – key value pair where the value is the default for each param.</a:t>
+            </a:r>
+          </a:p>
+        </p:txBody>
+      </p:sp>
+    </p:spTree>
+    <p:extLst>
+      <p:ext uri="{BB962C8B-B14F-4D97-AF65-F5344CB8AC3E}">
+        <p14:creationId xmlns:p14="http://schemas.microsoft.com/office/powerpoint/2010/main" val="1387123006"/>
+      </p:ext>
+    </p:extLst>
+  </p:cSld>
+  <p:clrMapOvr>
+    <a:masterClrMapping/>
+  </p:clrMapOvr>
+</p:sld>
+</file>
+
+<file path=ppt/slides/slide9.xml><?xml version="1.0" encoding="utf-8"?>
+<p:sld xmlns:a="http://schemas.openxmlformats.org/drawingml/2006/main" xmlns:r="http://schemas.openxmlformats.org/officeDocument/2006/relationships" xmlns:p="http://schemas.openxmlformats.org/presentationml/2006/main">
+  <p:cSld>
+    <p:spTree>
+      <p:nvGrpSpPr>
+        <p:cNvPr id="1" name=""/>
+        <p:cNvGrpSpPr/>
+        <p:nvPr/>
+      </p:nvGrpSpPr>
+      <p:grpSpPr>
+        <a:xfrm>
+          <a:off x="0" y="0"/>
+          <a:ext cx="0" cy="0"/>
+          <a:chOff x="0" y="0"/>
+          <a:chExt cx="0" cy="0"/>
+        </a:xfrm>
+      </p:grpSpPr>
+      <p:sp>
+        <p:nvSpPr>
+          <p:cNvPr id="2" name="Title 1">
+            <a:extLst>
+              <a:ext uri="{FF2B5EF4-FFF2-40B4-BE49-F238E27FC236}">
+                <a16:creationId xmlns:a16="http://schemas.microsoft.com/office/drawing/2014/main" id="{26E4BCBA-FF18-4234-9738-D4533BAE25A7}"/>
+              </a:ext>
+            </a:extLst>
+          </p:cNvPr>
+          <p:cNvSpPr>
+            <a:spLocks noGrp="1"/>
+          </p:cNvSpPr>
+          <p:nvPr>
+            <p:ph type="title"/>
+          </p:nvPr>
+        </p:nvSpPr>
+        <p:spPr>
+          <a:xfrm>
+            <a:off x="581192" y="702156"/>
+            <a:ext cx="11029616" cy="556193"/>
+          </a:xfrm>
+        </p:spPr>
+        <p:txBody>
+          <a:bodyPr>
+            <a:normAutofit fontScale="90000"/>
+          </a:bodyPr>
+          <a:lstStyle/>
+          <a:p>
+            <a:r>
+              <a:rPr lang="en-US" dirty="0"/>
+              <a:t>API Definitions &amp; Data</a:t>
+            </a:r>
+          </a:p>
+        </p:txBody>
+      </p:sp>
+      <p:sp>
+        <p:nvSpPr>
+          <p:cNvPr id="3" name="Content Placeholder 2">
+            <a:extLst>
+              <a:ext uri="{FF2B5EF4-FFF2-40B4-BE49-F238E27FC236}">
+                <a16:creationId xmlns:a16="http://schemas.microsoft.com/office/drawing/2014/main" id="{8D82351E-DB24-42C8-9BF2-D1DB8E8DE470}"/>
+              </a:ext>
+            </a:extLst>
+          </p:cNvPr>
+          <p:cNvSpPr>
+            <a:spLocks noGrp="1"/>
+          </p:cNvSpPr>
+          <p:nvPr>
+            <p:ph idx="1"/>
+          </p:nvPr>
+        </p:nvSpPr>
+        <p:spPr>
+          <a:xfrm>
+            <a:off x="581192" y="1264807"/>
+            <a:ext cx="11029615" cy="5161159"/>
+          </a:xfrm>
+        </p:spPr>
+        <p:txBody>
+          <a:bodyPr>
+            <a:normAutofit/>
+          </a:bodyPr>
+          <a:lstStyle/>
+          <a:p>
+            <a:pPr marL="285750" indent="-285750">
+              <a:buFont typeface="Arial" panose="020B0604020202020204" pitchFamily="34" charset="0"/>
+              <a:buChar char="•"/>
+            </a:pPr>
+            <a:r>
+              <a:rPr lang="en-US" sz="2000" dirty="0"/>
+              <a:t>Train Specific Model for </a:t>
+            </a:r>
+            <a:r>
+              <a:rPr lang="en-US" sz="2000" dirty="0" err="1"/>
+              <a:t>iPack</a:t>
+            </a:r>
+            <a:endParaRPr lang="en-US" sz="2000" dirty="0"/>
+          </a:p>
+          <a:p>
+            <a:pPr lvl="1"/>
+            <a:r>
+              <a:rPr lang="en-US" sz="1800" dirty="0"/>
+              <a:t>POST: </a:t>
+            </a:r>
+            <a:r>
+              <a:rPr lang="en-US" sz="1800" dirty="0">
+                <a:hlinkClick r:id="rId2"/>
+              </a:rPr>
+              <a:t>https://hosturl/api/v1/ml/models/train/</a:t>
+            </a:r>
+            <a:r>
+              <a:rPr lang="en-US" sz="1800" dirty="0"/>
+              <a:t> - body = application/json</a:t>
+            </a:r>
+          </a:p>
+          <a:p>
+            <a:pPr lvl="1"/>
+            <a:r>
+              <a:rPr lang="en-US" sz="1800" dirty="0"/>
+              <a:t>Properties</a:t>
+            </a:r>
+          </a:p>
+          <a:p>
+            <a:pPr lvl="2"/>
+            <a:r>
+              <a:rPr lang="en-US" sz="1600" dirty="0"/>
+              <a:t>“</a:t>
+            </a:r>
+            <a:r>
+              <a:rPr lang="en-US" sz="1600" dirty="0" err="1"/>
+              <a:t>PackId</a:t>
+            </a:r>
+            <a:r>
+              <a:rPr lang="en-US" sz="1600" dirty="0"/>
+              <a:t>” - String</a:t>
+            </a:r>
+          </a:p>
+          <a:p>
+            <a:pPr lvl="2"/>
+            <a:r>
+              <a:rPr lang="en-US" sz="1600" dirty="0"/>
+              <a:t>“</a:t>
+            </a:r>
+            <a:r>
+              <a:rPr lang="en-US" sz="1600" dirty="0" err="1"/>
+              <a:t>ProjectAlias</a:t>
+            </a:r>
+            <a:r>
+              <a:rPr lang="en-US" sz="1600" dirty="0"/>
+              <a:t>” – String</a:t>
+            </a:r>
+          </a:p>
+          <a:p>
+            <a:pPr lvl="2"/>
+            <a:r>
+              <a:rPr lang="en-US" sz="1600" dirty="0"/>
+              <a:t>“</a:t>
+            </a:r>
+            <a:r>
+              <a:rPr lang="en-US" sz="1600" dirty="0" err="1"/>
+              <a:t>ModelDefinitionName</a:t>
+            </a:r>
+            <a:r>
+              <a:rPr lang="en-US" sz="1600" dirty="0"/>
+              <a:t>” – String</a:t>
+            </a:r>
+          </a:p>
+          <a:p>
+            <a:pPr lvl="2"/>
+            <a:r>
+              <a:rPr lang="en-US" sz="1600" dirty="0"/>
+              <a:t>OPTIONAL:</a:t>
+            </a:r>
+          </a:p>
+          <a:p>
+            <a:pPr lvl="3"/>
+            <a:r>
+              <a:rPr lang="en-US" sz="1400" dirty="0"/>
+              <a:t>“params” : Dictionary&lt;&lt;</a:t>
+            </a:r>
+            <a:r>
+              <a:rPr lang="en-US" sz="1400" dirty="0" err="1"/>
+              <a:t>param_name</a:t>
+            </a:r>
+            <a:r>
+              <a:rPr lang="en-US" sz="1400" dirty="0"/>
+              <a:t>&gt;,&lt;</a:t>
+            </a:r>
+            <a:r>
+              <a:rPr lang="en-US" sz="1400" dirty="0" err="1"/>
+              <a:t>param_value</a:t>
+            </a:r>
+            <a:r>
+              <a:rPr lang="en-US" sz="1400" dirty="0"/>
+              <a:t>&gt;&gt;</a:t>
+            </a:r>
+          </a:p>
+          <a:p>
+            <a:pPr lvl="4"/>
+            <a:r>
+              <a:rPr lang="en-US" sz="1400" dirty="0"/>
+              <a:t>Defaults to defined defaults</a:t>
+            </a:r>
+          </a:p>
+          <a:p>
+            <a:pPr lvl="1"/>
+            <a:r>
+              <a:rPr lang="en-US" sz="2000" dirty="0"/>
+              <a:t>What it does:</a:t>
+            </a:r>
+          </a:p>
+          <a:p>
+            <a:pPr lvl="2"/>
+            <a:r>
+              <a:rPr lang="en-US" sz="1600" dirty="0"/>
+              <a:t>Retrieves the quantity of data currently staged (collected, but not transferred) in the </a:t>
+            </a:r>
+            <a:r>
+              <a:rPr lang="en-US" sz="1600" dirty="0" err="1"/>
+              <a:t>iPack’s</a:t>
+            </a:r>
+            <a:r>
+              <a:rPr lang="en-US" sz="1600" dirty="0"/>
+              <a:t> staging blob waiting to be transferred to the labelling tool’s storage location.</a:t>
+            </a:r>
+          </a:p>
+          <a:p>
+            <a:pPr lvl="2"/>
+            <a:r>
+              <a:rPr lang="en-US" sz="1600" dirty="0"/>
+              <a:t>This is counted as a discrete number of blobs in the blob storage.</a:t>
+            </a:r>
+            <a:endParaRPr lang="en-US" sz="1400" dirty="0"/>
+          </a:p>
+        </p:txBody>
+      </p:sp>
+    </p:spTree>
+    <p:extLst>
+      <p:ext uri="{BB962C8B-B14F-4D97-AF65-F5344CB8AC3E}">
+        <p14:creationId xmlns:p14="http://schemas.microsoft.com/office/powerpoint/2010/main" val="3110701194"/>
       </p:ext>
     </p:extLst>
   </p:cSld>

</xml_diff>